<commit_message>
add final project files
</commit_message>
<xml_diff>
--- a/게시판 미니프로젝트.pptx
+++ b/게시판 미니프로젝트.pptx
@@ -2,30 +2,29 @@
 <file path=ppt/presentation.xml><?xml version="1.0" encoding="utf-8"?>
 <p:presentation xmlns:a="http://schemas.openxmlformats.org/drawingml/2006/main" xmlns:r="http://schemas.openxmlformats.org/officeDocument/2006/relationships" xmlns:p="http://schemas.openxmlformats.org/presentationml/2006/main" strictFirstAndLastChars="0" embedTrueTypeFonts="1" saveSubsetFonts="1" autoCompressPictures="0">
   <p:sldMasterIdLst>
-    <p:sldMasterId id="2147483659" r:id="rId1"/>
+    <p:sldMasterId id="2147483648" r:id="rId1"/>
   </p:sldMasterIdLst>
   <p:notesMasterIdLst>
-    <p:notesMasterId r:id="rId12"/>
+    <p:notesMasterId r:id="rId4"/>
   </p:notesMasterIdLst>
   <p:sldIdLst>
-    <p:sldId id="259" r:id="rId2"/>
-    <p:sldId id="262" r:id="rId3"/>
-    <p:sldId id="260" r:id="rId4"/>
-    <p:sldId id="286" r:id="rId5"/>
-    <p:sldId id="287" r:id="rId6"/>
-    <p:sldId id="265" r:id="rId7"/>
-    <p:sldId id="266" r:id="rId8"/>
-    <p:sldId id="282" r:id="rId9"/>
-    <p:sldId id="283" r:id="rId10"/>
-    <p:sldId id="285" r:id="rId11"/>
+    <p:sldId id="259" r:id="rId3"/>
+    <p:sldId id="262" r:id="rId5"/>
+    <p:sldId id="260" r:id="rId6"/>
+    <p:sldId id="286" r:id="rId7"/>
+    <p:sldId id="287" r:id="rId8"/>
+    <p:sldId id="265" r:id="rId9"/>
+    <p:sldId id="266" r:id="rId10"/>
+    <p:sldId id="282" r:id="rId11"/>
+    <p:sldId id="283" r:id="rId12"/>
+    <p:sldId id="285" r:id="rId13"/>
   </p:sldIdLst>
   <p:sldSz cx="9144000" cy="5143500" type="screen16x9"/>
   <p:notesSz cx="6858000" cy="9144000"/>
   <p:embeddedFontLst>
     <p:embeddedFont>
-      <p:font typeface="Malgun Gothic" panose="020B0503020000020004" pitchFamily="50" charset="-127"/>
-      <p:regular r:id="rId13"/>
-      <p:bold r:id="rId14"/>
+      <p:font typeface="맑은 고딕" panose="020B0503020000020004" charset="-127"/>
+      <p:regular r:id="rId17"/>
     </p:embeddedFont>
   </p:embeddedFontLst>
   <p:defaultTextStyle>
@@ -53,15 +52,15 @@
       <a:buClr>
         <a:srgbClr val="000000"/>
       </a:buClr>
-      <a:buFont typeface="Arial"/>
+      <a:buFont typeface="Arial" panose="020B0604020202020204"/>
       <a:defRPr sz="1400" b="0" i="0" u="none" strike="noStrike" cap="none">
         <a:solidFill>
           <a:srgbClr val="000000"/>
         </a:solidFill>
-        <a:latin typeface="Arial"/>
-        <a:ea typeface="Arial"/>
-        <a:cs typeface="Arial"/>
-        <a:sym typeface="Arial"/>
+        <a:latin typeface="Arial" panose="020B0604020202020204"/>
+        <a:ea typeface="Arial" panose="020B0604020202020204"/>
+        <a:cs typeface="Arial" panose="020B0604020202020204"/>
+        <a:sym typeface="Arial" panose="020B0604020202020204"/>
       </a:defRPr>
     </a:lvl1pPr>
     <a:lvl2pPr marR="0" lvl="1" algn="l" rtl="0">
@@ -77,15 +76,15 @@
       <a:buClr>
         <a:srgbClr val="000000"/>
       </a:buClr>
-      <a:buFont typeface="Arial"/>
+      <a:buFont typeface="Arial" panose="020B0604020202020204"/>
       <a:defRPr sz="1400" b="0" i="0" u="none" strike="noStrike" cap="none">
         <a:solidFill>
           <a:srgbClr val="000000"/>
         </a:solidFill>
-        <a:latin typeface="Arial"/>
-        <a:ea typeface="Arial"/>
-        <a:cs typeface="Arial"/>
-        <a:sym typeface="Arial"/>
+        <a:latin typeface="Arial" panose="020B0604020202020204"/>
+        <a:ea typeface="Arial" panose="020B0604020202020204"/>
+        <a:cs typeface="Arial" panose="020B0604020202020204"/>
+        <a:sym typeface="Arial" panose="020B0604020202020204"/>
       </a:defRPr>
     </a:lvl2pPr>
     <a:lvl3pPr marR="0" lvl="2" algn="l" rtl="0">
@@ -101,15 +100,15 @@
       <a:buClr>
         <a:srgbClr val="000000"/>
       </a:buClr>
-      <a:buFont typeface="Arial"/>
+      <a:buFont typeface="Arial" panose="020B0604020202020204"/>
       <a:defRPr sz="1400" b="0" i="0" u="none" strike="noStrike" cap="none">
         <a:solidFill>
           <a:srgbClr val="000000"/>
         </a:solidFill>
-        <a:latin typeface="Arial"/>
-        <a:ea typeface="Arial"/>
-        <a:cs typeface="Arial"/>
-        <a:sym typeface="Arial"/>
+        <a:latin typeface="Arial" panose="020B0604020202020204"/>
+        <a:ea typeface="Arial" panose="020B0604020202020204"/>
+        <a:cs typeface="Arial" panose="020B0604020202020204"/>
+        <a:sym typeface="Arial" panose="020B0604020202020204"/>
       </a:defRPr>
     </a:lvl3pPr>
     <a:lvl4pPr marR="0" lvl="3" algn="l" rtl="0">
@@ -125,15 +124,15 @@
       <a:buClr>
         <a:srgbClr val="000000"/>
       </a:buClr>
-      <a:buFont typeface="Arial"/>
+      <a:buFont typeface="Arial" panose="020B0604020202020204"/>
       <a:defRPr sz="1400" b="0" i="0" u="none" strike="noStrike" cap="none">
         <a:solidFill>
           <a:srgbClr val="000000"/>
         </a:solidFill>
-        <a:latin typeface="Arial"/>
-        <a:ea typeface="Arial"/>
-        <a:cs typeface="Arial"/>
-        <a:sym typeface="Arial"/>
+        <a:latin typeface="Arial" panose="020B0604020202020204"/>
+        <a:ea typeface="Arial" panose="020B0604020202020204"/>
+        <a:cs typeface="Arial" panose="020B0604020202020204"/>
+        <a:sym typeface="Arial" panose="020B0604020202020204"/>
       </a:defRPr>
     </a:lvl4pPr>
     <a:lvl5pPr marR="0" lvl="4" algn="l" rtl="0">
@@ -149,15 +148,15 @@
       <a:buClr>
         <a:srgbClr val="000000"/>
       </a:buClr>
-      <a:buFont typeface="Arial"/>
+      <a:buFont typeface="Arial" panose="020B0604020202020204"/>
       <a:defRPr sz="1400" b="0" i="0" u="none" strike="noStrike" cap="none">
         <a:solidFill>
           <a:srgbClr val="000000"/>
         </a:solidFill>
-        <a:latin typeface="Arial"/>
-        <a:ea typeface="Arial"/>
-        <a:cs typeface="Arial"/>
-        <a:sym typeface="Arial"/>
+        <a:latin typeface="Arial" panose="020B0604020202020204"/>
+        <a:ea typeface="Arial" panose="020B0604020202020204"/>
+        <a:cs typeface="Arial" panose="020B0604020202020204"/>
+        <a:sym typeface="Arial" panose="020B0604020202020204"/>
       </a:defRPr>
     </a:lvl5pPr>
     <a:lvl6pPr marR="0" lvl="5" algn="l" rtl="0">
@@ -173,15 +172,15 @@
       <a:buClr>
         <a:srgbClr val="000000"/>
       </a:buClr>
-      <a:buFont typeface="Arial"/>
+      <a:buFont typeface="Arial" panose="020B0604020202020204"/>
       <a:defRPr sz="1400" b="0" i="0" u="none" strike="noStrike" cap="none">
         <a:solidFill>
           <a:srgbClr val="000000"/>
         </a:solidFill>
-        <a:latin typeface="Arial"/>
-        <a:ea typeface="Arial"/>
-        <a:cs typeface="Arial"/>
-        <a:sym typeface="Arial"/>
+        <a:latin typeface="Arial" panose="020B0604020202020204"/>
+        <a:ea typeface="Arial" panose="020B0604020202020204"/>
+        <a:cs typeface="Arial" panose="020B0604020202020204"/>
+        <a:sym typeface="Arial" panose="020B0604020202020204"/>
       </a:defRPr>
     </a:lvl6pPr>
     <a:lvl7pPr marR="0" lvl="6" algn="l" rtl="0">
@@ -197,15 +196,15 @@
       <a:buClr>
         <a:srgbClr val="000000"/>
       </a:buClr>
-      <a:buFont typeface="Arial"/>
+      <a:buFont typeface="Arial" panose="020B0604020202020204"/>
       <a:defRPr sz="1400" b="0" i="0" u="none" strike="noStrike" cap="none">
         <a:solidFill>
           <a:srgbClr val="000000"/>
         </a:solidFill>
-        <a:latin typeface="Arial"/>
-        <a:ea typeface="Arial"/>
-        <a:cs typeface="Arial"/>
-        <a:sym typeface="Arial"/>
+        <a:latin typeface="Arial" panose="020B0604020202020204"/>
+        <a:ea typeface="Arial" panose="020B0604020202020204"/>
+        <a:cs typeface="Arial" panose="020B0604020202020204"/>
+        <a:sym typeface="Arial" panose="020B0604020202020204"/>
       </a:defRPr>
     </a:lvl7pPr>
     <a:lvl8pPr marR="0" lvl="7" algn="l" rtl="0">
@@ -221,15 +220,15 @@
       <a:buClr>
         <a:srgbClr val="000000"/>
       </a:buClr>
-      <a:buFont typeface="Arial"/>
+      <a:buFont typeface="Arial" panose="020B0604020202020204"/>
       <a:defRPr sz="1400" b="0" i="0" u="none" strike="noStrike" cap="none">
         <a:solidFill>
           <a:srgbClr val="000000"/>
         </a:solidFill>
-        <a:latin typeface="Arial"/>
-        <a:ea typeface="Arial"/>
-        <a:cs typeface="Arial"/>
-        <a:sym typeface="Arial"/>
+        <a:latin typeface="Arial" panose="020B0604020202020204"/>
+        <a:ea typeface="Arial" panose="020B0604020202020204"/>
+        <a:cs typeface="Arial" panose="020B0604020202020204"/>
+        <a:sym typeface="Arial" panose="020B0604020202020204"/>
       </a:defRPr>
     </a:lvl8pPr>
     <a:lvl9pPr marR="0" lvl="8" algn="l" rtl="0">
@@ -245,15 +244,15 @@
       <a:buClr>
         <a:srgbClr val="000000"/>
       </a:buClr>
-      <a:buFont typeface="Arial"/>
+      <a:buFont typeface="Arial" panose="020B0604020202020204"/>
       <a:defRPr sz="1400" b="0" i="0" u="none" strike="noStrike" cap="none">
         <a:solidFill>
           <a:srgbClr val="000000"/>
         </a:solidFill>
-        <a:latin typeface="Arial"/>
-        <a:ea typeface="Arial"/>
-        <a:cs typeface="Arial"/>
-        <a:sym typeface="Arial"/>
+        <a:latin typeface="Arial" panose="020B0604020202020204"/>
+        <a:ea typeface="Arial" panose="020B0604020202020204"/>
+        <a:cs typeface="Arial" panose="020B0604020202020204"/>
+        <a:sym typeface="Arial" panose="020B0604020202020204"/>
       </a:defRPr>
     </a:lvl9pPr>
   </p:defaultTextStyle>
@@ -461,9 +460,7 @@
               <a:defRPr sz="1100"/>
             </a:lvl9pPr>
           </a:lstStyle>
-          <a:p>
-            <a:endParaRPr/>
-          </a:p>
+          <a:p/>
         </p:txBody>
       </p:sp>
     </p:spTree>
@@ -494,15 +491,15 @@
       <a:buClr>
         <a:srgbClr val="000000"/>
       </a:buClr>
-      <a:buFont typeface="Arial"/>
+      <a:buFont typeface="Arial" panose="020B0604020202020204"/>
       <a:defRPr sz="1400" b="0" i="0" u="none" strike="noStrike" cap="none">
         <a:solidFill>
           <a:srgbClr val="000000"/>
         </a:solidFill>
-        <a:latin typeface="Arial"/>
-        <a:ea typeface="Arial"/>
-        <a:cs typeface="Arial"/>
-        <a:sym typeface="Arial"/>
+        <a:latin typeface="Arial" panose="020B0604020202020204"/>
+        <a:ea typeface="Arial" panose="020B0604020202020204"/>
+        <a:cs typeface="Arial" panose="020B0604020202020204"/>
+        <a:sym typeface="Arial" panose="020B0604020202020204"/>
       </a:defRPr>
     </a:lvl1pPr>
     <a:lvl2pPr marR="0" lvl="1" algn="l" rtl="0">
@@ -518,15 +515,15 @@
       <a:buClr>
         <a:srgbClr val="000000"/>
       </a:buClr>
-      <a:buFont typeface="Arial"/>
+      <a:buFont typeface="Arial" panose="020B0604020202020204"/>
       <a:defRPr sz="1400" b="0" i="0" u="none" strike="noStrike" cap="none">
         <a:solidFill>
           <a:srgbClr val="000000"/>
         </a:solidFill>
-        <a:latin typeface="Arial"/>
-        <a:ea typeface="Arial"/>
-        <a:cs typeface="Arial"/>
-        <a:sym typeface="Arial"/>
+        <a:latin typeface="Arial" panose="020B0604020202020204"/>
+        <a:ea typeface="Arial" panose="020B0604020202020204"/>
+        <a:cs typeface="Arial" panose="020B0604020202020204"/>
+        <a:sym typeface="Arial" panose="020B0604020202020204"/>
       </a:defRPr>
     </a:lvl2pPr>
     <a:lvl3pPr marR="0" lvl="2" algn="l" rtl="0">
@@ -542,15 +539,15 @@
       <a:buClr>
         <a:srgbClr val="000000"/>
       </a:buClr>
-      <a:buFont typeface="Arial"/>
+      <a:buFont typeface="Arial" panose="020B0604020202020204"/>
       <a:defRPr sz="1400" b="0" i="0" u="none" strike="noStrike" cap="none">
         <a:solidFill>
           <a:srgbClr val="000000"/>
         </a:solidFill>
-        <a:latin typeface="Arial"/>
-        <a:ea typeface="Arial"/>
-        <a:cs typeface="Arial"/>
-        <a:sym typeface="Arial"/>
+        <a:latin typeface="Arial" panose="020B0604020202020204"/>
+        <a:ea typeface="Arial" panose="020B0604020202020204"/>
+        <a:cs typeface="Arial" panose="020B0604020202020204"/>
+        <a:sym typeface="Arial" panose="020B0604020202020204"/>
       </a:defRPr>
     </a:lvl3pPr>
     <a:lvl4pPr marR="0" lvl="3" algn="l" rtl="0">
@@ -566,15 +563,15 @@
       <a:buClr>
         <a:srgbClr val="000000"/>
       </a:buClr>
-      <a:buFont typeface="Arial"/>
+      <a:buFont typeface="Arial" panose="020B0604020202020204"/>
       <a:defRPr sz="1400" b="0" i="0" u="none" strike="noStrike" cap="none">
         <a:solidFill>
           <a:srgbClr val="000000"/>
         </a:solidFill>
-        <a:latin typeface="Arial"/>
-        <a:ea typeface="Arial"/>
-        <a:cs typeface="Arial"/>
-        <a:sym typeface="Arial"/>
+        <a:latin typeface="Arial" panose="020B0604020202020204"/>
+        <a:ea typeface="Arial" panose="020B0604020202020204"/>
+        <a:cs typeface="Arial" panose="020B0604020202020204"/>
+        <a:sym typeface="Arial" panose="020B0604020202020204"/>
       </a:defRPr>
     </a:lvl4pPr>
     <a:lvl5pPr marR="0" lvl="4" algn="l" rtl="0">
@@ -590,15 +587,15 @@
       <a:buClr>
         <a:srgbClr val="000000"/>
       </a:buClr>
-      <a:buFont typeface="Arial"/>
+      <a:buFont typeface="Arial" panose="020B0604020202020204"/>
       <a:defRPr sz="1400" b="0" i="0" u="none" strike="noStrike" cap="none">
         <a:solidFill>
           <a:srgbClr val="000000"/>
         </a:solidFill>
-        <a:latin typeface="Arial"/>
-        <a:ea typeface="Arial"/>
-        <a:cs typeface="Arial"/>
-        <a:sym typeface="Arial"/>
+        <a:latin typeface="Arial" panose="020B0604020202020204"/>
+        <a:ea typeface="Arial" panose="020B0604020202020204"/>
+        <a:cs typeface="Arial" panose="020B0604020202020204"/>
+        <a:sym typeface="Arial" panose="020B0604020202020204"/>
       </a:defRPr>
     </a:lvl5pPr>
     <a:lvl6pPr marR="0" lvl="5" algn="l" rtl="0">
@@ -614,15 +611,15 @@
       <a:buClr>
         <a:srgbClr val="000000"/>
       </a:buClr>
-      <a:buFont typeface="Arial"/>
+      <a:buFont typeface="Arial" panose="020B0604020202020204"/>
       <a:defRPr sz="1400" b="0" i="0" u="none" strike="noStrike" cap="none">
         <a:solidFill>
           <a:srgbClr val="000000"/>
         </a:solidFill>
-        <a:latin typeface="Arial"/>
-        <a:ea typeface="Arial"/>
-        <a:cs typeface="Arial"/>
-        <a:sym typeface="Arial"/>
+        <a:latin typeface="Arial" panose="020B0604020202020204"/>
+        <a:ea typeface="Arial" panose="020B0604020202020204"/>
+        <a:cs typeface="Arial" panose="020B0604020202020204"/>
+        <a:sym typeface="Arial" panose="020B0604020202020204"/>
       </a:defRPr>
     </a:lvl6pPr>
     <a:lvl7pPr marR="0" lvl="6" algn="l" rtl="0">
@@ -638,15 +635,15 @@
       <a:buClr>
         <a:srgbClr val="000000"/>
       </a:buClr>
-      <a:buFont typeface="Arial"/>
+      <a:buFont typeface="Arial" panose="020B0604020202020204"/>
       <a:defRPr sz="1400" b="0" i="0" u="none" strike="noStrike" cap="none">
         <a:solidFill>
           <a:srgbClr val="000000"/>
         </a:solidFill>
-        <a:latin typeface="Arial"/>
-        <a:ea typeface="Arial"/>
-        <a:cs typeface="Arial"/>
-        <a:sym typeface="Arial"/>
+        <a:latin typeface="Arial" panose="020B0604020202020204"/>
+        <a:ea typeface="Arial" panose="020B0604020202020204"/>
+        <a:cs typeface="Arial" panose="020B0604020202020204"/>
+        <a:sym typeface="Arial" panose="020B0604020202020204"/>
       </a:defRPr>
     </a:lvl7pPr>
     <a:lvl8pPr marR="0" lvl="7" algn="l" rtl="0">
@@ -662,15 +659,15 @@
       <a:buClr>
         <a:srgbClr val="000000"/>
       </a:buClr>
-      <a:buFont typeface="Arial"/>
+      <a:buFont typeface="Arial" panose="020B0604020202020204"/>
       <a:defRPr sz="1400" b="0" i="0" u="none" strike="noStrike" cap="none">
         <a:solidFill>
           <a:srgbClr val="000000"/>
         </a:solidFill>
-        <a:latin typeface="Arial"/>
-        <a:ea typeface="Arial"/>
-        <a:cs typeface="Arial"/>
-        <a:sym typeface="Arial"/>
+        <a:latin typeface="Arial" panose="020B0604020202020204"/>
+        <a:ea typeface="Arial" panose="020B0604020202020204"/>
+        <a:cs typeface="Arial" panose="020B0604020202020204"/>
+        <a:sym typeface="Arial" panose="020B0604020202020204"/>
       </a:defRPr>
     </a:lvl8pPr>
     <a:lvl9pPr marR="0" lvl="8" algn="l" rtl="0">
@@ -686,15 +683,15 @@
       <a:buClr>
         <a:srgbClr val="000000"/>
       </a:buClr>
-      <a:buFont typeface="Arial"/>
+      <a:buFont typeface="Arial" panose="020B0604020202020204"/>
       <a:defRPr sz="1400" b="0" i="0" u="none" strike="noStrike" cap="none">
         <a:solidFill>
           <a:srgbClr val="000000"/>
         </a:solidFill>
-        <a:latin typeface="Arial"/>
-        <a:ea typeface="Arial"/>
-        <a:cs typeface="Arial"/>
-        <a:sym typeface="Arial"/>
+        <a:latin typeface="Arial" panose="020B0604020202020204"/>
+        <a:ea typeface="Arial" panose="020B0604020202020204"/>
+        <a:cs typeface="Arial" panose="020B0604020202020204"/>
+        <a:sym typeface="Arial" panose="020B0604020202020204"/>
       </a:defRPr>
     </a:lvl9pPr>
   </p:notesStyle>
@@ -702,7 +699,7 @@
 </file>
 
 <file path=ppt/notesSlides/notesSlide1.xml><?xml version="1.0" encoding="utf-8"?>
-<p:notes xmlns:a="http://schemas.openxmlformats.org/drawingml/2006/main" xmlns:r="http://schemas.openxmlformats.org/officeDocument/2006/relationships" xmlns:p="http://schemas.openxmlformats.org/presentationml/2006/main" showMasterSp="0" showMasterPhAnim="0">
+<p:notes xmlns:a="http://schemas.openxmlformats.org/drawingml/2006/main" xmlns:r="http://schemas.openxmlformats.org/officeDocument/2006/relationships" xmlns:p="http://schemas.openxmlformats.org/presentationml/2006/main" showMasterPhAnim="0" showMasterSp="0">
   <p:cSld>
     <p:spTree>
       <p:nvGrpSpPr>
@@ -793,7 +790,6 @@
               </a:spcAft>
               <a:buNone/>
             </a:pPr>
-            <a:endParaRPr/>
           </a:p>
         </p:txBody>
       </p:sp>
@@ -806,7 +802,7 @@
 </file>
 
 <file path=ppt/notesSlides/notesSlide10.xml><?xml version="1.0" encoding="utf-8"?>
-<p:notes xmlns:a="http://schemas.openxmlformats.org/drawingml/2006/main" xmlns:r="http://schemas.openxmlformats.org/officeDocument/2006/relationships" xmlns:p="http://schemas.openxmlformats.org/presentationml/2006/main" showMasterSp="0" showMasterPhAnim="0">
+<p:notes xmlns:a="http://schemas.openxmlformats.org/drawingml/2006/main" xmlns:r="http://schemas.openxmlformats.org/officeDocument/2006/relationships" xmlns:p="http://schemas.openxmlformats.org/presentationml/2006/main" showMasterPhAnim="0" showMasterSp="0">
   <p:cSld>
     <p:spTree>
       <p:nvGrpSpPr>
@@ -897,7 +893,6 @@
               </a:spcAft>
               <a:buNone/>
             </a:pPr>
-            <a:endParaRPr/>
           </a:p>
         </p:txBody>
       </p:sp>
@@ -910,7 +905,7 @@
 </file>
 
 <file path=ppt/notesSlides/notesSlide2.xml><?xml version="1.0" encoding="utf-8"?>
-<p:notes xmlns:a="http://schemas.openxmlformats.org/drawingml/2006/main" xmlns:r="http://schemas.openxmlformats.org/officeDocument/2006/relationships" xmlns:p="http://schemas.openxmlformats.org/presentationml/2006/main" showMasterSp="0" showMasterPhAnim="0">
+<p:notes xmlns:a="http://schemas.openxmlformats.org/drawingml/2006/main" xmlns:r="http://schemas.openxmlformats.org/officeDocument/2006/relationships" xmlns:p="http://schemas.openxmlformats.org/presentationml/2006/main" showMasterPhAnim="0" showMasterSp="0">
   <p:cSld>
     <p:spTree>
       <p:nvGrpSpPr>
@@ -1001,7 +996,6 @@
               </a:spcAft>
               <a:buNone/>
             </a:pPr>
-            <a:endParaRPr/>
           </a:p>
         </p:txBody>
       </p:sp>
@@ -1014,7 +1008,7 @@
 </file>
 
 <file path=ppt/notesSlides/notesSlide3.xml><?xml version="1.0" encoding="utf-8"?>
-<p:notes xmlns:a="http://schemas.openxmlformats.org/drawingml/2006/main" xmlns:r="http://schemas.openxmlformats.org/officeDocument/2006/relationships" xmlns:p="http://schemas.openxmlformats.org/presentationml/2006/main" showMasterSp="0" showMasterPhAnim="0">
+<p:notes xmlns:a="http://schemas.openxmlformats.org/drawingml/2006/main" xmlns:r="http://schemas.openxmlformats.org/officeDocument/2006/relationships" xmlns:p="http://schemas.openxmlformats.org/presentationml/2006/main" showMasterPhAnim="0" showMasterSp="0">
   <p:cSld>
     <p:spTree>
       <p:nvGrpSpPr>
@@ -1105,7 +1099,6 @@
               </a:spcAft>
               <a:buNone/>
             </a:pPr>
-            <a:endParaRPr/>
           </a:p>
         </p:txBody>
       </p:sp>
@@ -1118,7 +1111,7 @@
 </file>
 
 <file path=ppt/notesSlides/notesSlide4.xml><?xml version="1.0" encoding="utf-8"?>
-<p:notes xmlns:a="http://schemas.openxmlformats.org/drawingml/2006/main" xmlns:r="http://schemas.openxmlformats.org/officeDocument/2006/relationships" xmlns:p="http://schemas.openxmlformats.org/presentationml/2006/main" showMasterSp="0" showMasterPhAnim="0">
+<p:notes xmlns:a="http://schemas.openxmlformats.org/drawingml/2006/main" xmlns:r="http://schemas.openxmlformats.org/officeDocument/2006/relationships" xmlns:p="http://schemas.openxmlformats.org/presentationml/2006/main" showMasterPhAnim="0" showMasterSp="0">
   <p:cSld>
     <p:spTree>
       <p:nvGrpSpPr>
@@ -1209,16 +1202,10 @@
               </a:spcAft>
               <a:buNone/>
             </a:pPr>
-            <a:endParaRPr/>
           </a:p>
         </p:txBody>
       </p:sp>
     </p:spTree>
-    <p:extLst>
-      <p:ext uri="{BB962C8B-B14F-4D97-AF65-F5344CB8AC3E}">
-        <p14:creationId xmlns:p14="http://schemas.microsoft.com/office/powerpoint/2010/main" val="1208251420"/>
-      </p:ext>
-    </p:extLst>
   </p:cSld>
   <p:clrMapOvr>
     <a:masterClrMapping/>
@@ -1227,7 +1214,7 @@
 </file>
 
 <file path=ppt/notesSlides/notesSlide5.xml><?xml version="1.0" encoding="utf-8"?>
-<p:notes xmlns:a="http://schemas.openxmlformats.org/drawingml/2006/main" xmlns:r="http://schemas.openxmlformats.org/officeDocument/2006/relationships" xmlns:p="http://schemas.openxmlformats.org/presentationml/2006/main" showMasterSp="0" showMasterPhAnim="0">
+<p:notes xmlns:a="http://schemas.openxmlformats.org/drawingml/2006/main" xmlns:r="http://schemas.openxmlformats.org/officeDocument/2006/relationships" xmlns:p="http://schemas.openxmlformats.org/presentationml/2006/main" showMasterPhAnim="0" showMasterSp="0">
   <p:cSld>
     <p:spTree>
       <p:nvGrpSpPr>
@@ -1318,16 +1305,10 @@
               </a:spcAft>
               <a:buNone/>
             </a:pPr>
-            <a:endParaRPr/>
           </a:p>
         </p:txBody>
       </p:sp>
     </p:spTree>
-    <p:extLst>
-      <p:ext uri="{BB962C8B-B14F-4D97-AF65-F5344CB8AC3E}">
-        <p14:creationId xmlns:p14="http://schemas.microsoft.com/office/powerpoint/2010/main" val="3348574655"/>
-      </p:ext>
-    </p:extLst>
   </p:cSld>
   <p:clrMapOvr>
     <a:masterClrMapping/>
@@ -1336,7 +1317,7 @@
 </file>
 
 <file path=ppt/notesSlides/notesSlide6.xml><?xml version="1.0" encoding="utf-8"?>
-<p:notes xmlns:a="http://schemas.openxmlformats.org/drawingml/2006/main" xmlns:r="http://schemas.openxmlformats.org/officeDocument/2006/relationships" xmlns:p="http://schemas.openxmlformats.org/presentationml/2006/main" showMasterSp="0" showMasterPhAnim="0">
+<p:notes xmlns:a="http://schemas.openxmlformats.org/drawingml/2006/main" xmlns:r="http://schemas.openxmlformats.org/officeDocument/2006/relationships" xmlns:p="http://schemas.openxmlformats.org/presentationml/2006/main" showMasterPhAnim="0" showMasterSp="0">
   <p:cSld>
     <p:spTree>
       <p:nvGrpSpPr>
@@ -1427,7 +1408,6 @@
               </a:spcAft>
               <a:buNone/>
             </a:pPr>
-            <a:endParaRPr/>
           </a:p>
         </p:txBody>
       </p:sp>
@@ -1440,7 +1420,7 @@
 </file>
 
 <file path=ppt/notesSlides/notesSlide7.xml><?xml version="1.0" encoding="utf-8"?>
-<p:notes xmlns:a="http://schemas.openxmlformats.org/drawingml/2006/main" xmlns:r="http://schemas.openxmlformats.org/officeDocument/2006/relationships" xmlns:p="http://schemas.openxmlformats.org/presentationml/2006/main" showMasterSp="0" showMasterPhAnim="0">
+<p:notes xmlns:a="http://schemas.openxmlformats.org/drawingml/2006/main" xmlns:r="http://schemas.openxmlformats.org/officeDocument/2006/relationships" xmlns:p="http://schemas.openxmlformats.org/presentationml/2006/main" showMasterPhAnim="0" showMasterSp="0">
   <p:cSld>
     <p:spTree>
       <p:nvGrpSpPr>
@@ -1531,7 +1511,6 @@
               </a:spcAft>
               <a:buNone/>
             </a:pPr>
-            <a:endParaRPr/>
           </a:p>
         </p:txBody>
       </p:sp>
@@ -1544,7 +1523,7 @@
 </file>
 
 <file path=ppt/notesSlides/notesSlide8.xml><?xml version="1.0" encoding="utf-8"?>
-<p:notes xmlns:a="http://schemas.openxmlformats.org/drawingml/2006/main" xmlns:r="http://schemas.openxmlformats.org/officeDocument/2006/relationships" xmlns:p="http://schemas.openxmlformats.org/presentationml/2006/main" showMasterSp="0" showMasterPhAnim="0">
+<p:notes xmlns:a="http://schemas.openxmlformats.org/drawingml/2006/main" xmlns:r="http://schemas.openxmlformats.org/officeDocument/2006/relationships" xmlns:p="http://schemas.openxmlformats.org/presentationml/2006/main" showMasterPhAnim="0" showMasterSp="0">
   <p:cSld>
     <p:spTree>
       <p:nvGrpSpPr>
@@ -1635,7 +1614,6 @@
               </a:spcAft>
               <a:buNone/>
             </a:pPr>
-            <a:endParaRPr/>
           </a:p>
         </p:txBody>
       </p:sp>
@@ -1648,7 +1626,7 @@
 </file>
 
 <file path=ppt/notesSlides/notesSlide9.xml><?xml version="1.0" encoding="utf-8"?>
-<p:notes xmlns:a="http://schemas.openxmlformats.org/drawingml/2006/main" xmlns:r="http://schemas.openxmlformats.org/officeDocument/2006/relationships" xmlns:p="http://schemas.openxmlformats.org/presentationml/2006/main" showMasterSp="0" showMasterPhAnim="0">
+<p:notes xmlns:a="http://schemas.openxmlformats.org/drawingml/2006/main" xmlns:r="http://schemas.openxmlformats.org/officeDocument/2006/relationships" xmlns:p="http://schemas.openxmlformats.org/presentationml/2006/main" showMasterPhAnim="0" showMasterSp="0">
   <p:cSld>
     <p:spTree>
       <p:nvGrpSpPr>
@@ -1739,7 +1717,6 @@
               </a:spcAft>
               <a:buNone/>
             </a:pPr>
-            <a:endParaRPr/>
           </a:p>
         </p:txBody>
       </p:sp>
@@ -1752,7 +1729,7 @@
 </file>
 
 <file path=ppt/slideLayouts/slideLayout1.xml><?xml version="1.0" encoding="utf-8"?>
-<p:sldLayout xmlns:a="http://schemas.openxmlformats.org/drawingml/2006/main" xmlns:r="http://schemas.openxmlformats.org/officeDocument/2006/relationships" xmlns:p="http://schemas.openxmlformats.org/presentationml/2006/main" matchingName="Title slide" type="title">
+<p:sldLayout xmlns:a="http://schemas.openxmlformats.org/drawingml/2006/main" xmlns:r="http://schemas.openxmlformats.org/officeDocument/2006/relationships" xmlns:p="http://schemas.openxmlformats.org/presentationml/2006/main" type="title" matchingName="Title slide">
   <p:cSld name="TITLE">
     <p:spTree>
       <p:nvGrpSpPr>
@@ -1892,9 +1869,7 @@
               <a:defRPr sz="5200"/>
             </a:lvl9pPr>
           </a:lstStyle>
-          <a:p>
-            <a:endParaRPr/>
-          </a:p>
+          <a:p/>
         </p:txBody>
       </p:sp>
       <p:sp>
@@ -2048,9 +2023,7 @@
               <a:defRPr sz="2800"/>
             </a:lvl9pPr>
           </a:lstStyle>
-          <a:p>
-            <a:endParaRPr/>
-          </a:p>
+          <a:p/>
         </p:txBody>
       </p:sp>
       <p:sp>
@@ -2125,10 +2098,9 @@
               <a:buNone/>
             </a:pPr>
             <a:fld id="{00000000-1234-1234-1234-123412341234}" type="slidenum">
-              <a:rPr lang="ko"/>
-              <a:t>‹#›</a:t>
+              <a:rPr lang="en-US"/>
             </a:fld>
-            <a:endParaRPr/>
+            <a:endParaRPr lang="en-US"/>
           </a:p>
         </p:txBody>
       </p:sp>
@@ -2412,9 +2384,7 @@
               <a:defRPr/>
             </a:lvl9pPr>
           </a:lstStyle>
-          <a:p>
-            <a:endParaRPr/>
-          </a:p>
+          <a:p/>
         </p:txBody>
       </p:sp>
       <p:sp>
@@ -2489,10 +2459,9 @@
               <a:buNone/>
             </a:pPr>
             <a:fld id="{00000000-1234-1234-1234-123412341234}" type="slidenum">
-              <a:rPr lang="ko"/>
-              <a:t>‹#›</a:t>
+              <a:rPr lang="en-US"/>
             </a:fld>
-            <a:endParaRPr/>
+            <a:endParaRPr lang="en-US"/>
           </a:p>
         </p:txBody>
       </p:sp>
@@ -2505,7 +2474,7 @@
 </file>
 
 <file path=ppt/slideLayouts/slideLayout11.xml><?xml version="1.0" encoding="utf-8"?>
-<p:sldLayout xmlns:a="http://schemas.openxmlformats.org/drawingml/2006/main" xmlns:r="http://schemas.openxmlformats.org/officeDocument/2006/relationships" xmlns:p="http://schemas.openxmlformats.org/presentationml/2006/main" matchingName="Blank" type="blank">
+<p:sldLayout xmlns:a="http://schemas.openxmlformats.org/drawingml/2006/main" xmlns:r="http://schemas.openxmlformats.org/officeDocument/2006/relationships" xmlns:p="http://schemas.openxmlformats.org/presentationml/2006/main" type="blank" matchingName="Blank">
   <p:cSld name="BLANK">
     <p:spTree>
       <p:nvGrpSpPr>
@@ -2593,10 +2562,9 @@
               <a:buNone/>
             </a:pPr>
             <a:fld id="{00000000-1234-1234-1234-123412341234}" type="slidenum">
-              <a:rPr lang="ko"/>
-              <a:t>‹#›</a:t>
+              <a:rPr lang="en-US"/>
             </a:fld>
-            <a:endParaRPr/>
+            <a:endParaRPr lang="en-US"/>
           </a:p>
         </p:txBody>
       </p:sp>
@@ -2609,7 +2577,7 @@
 </file>
 
 <file path=ppt/slideLayouts/slideLayout2.xml><?xml version="1.0" encoding="utf-8"?>
-<p:sldLayout xmlns:a="http://schemas.openxmlformats.org/drawingml/2006/main" xmlns:r="http://schemas.openxmlformats.org/officeDocument/2006/relationships" xmlns:p="http://schemas.openxmlformats.org/presentationml/2006/main" matchingName="Section header" type="secHead">
+<p:sldLayout xmlns:a="http://schemas.openxmlformats.org/drawingml/2006/main" xmlns:r="http://schemas.openxmlformats.org/officeDocument/2006/relationships" xmlns:p="http://schemas.openxmlformats.org/presentationml/2006/main" type="secHead" matchingName="Section header">
   <p:cSld name="SECTION_HEADER">
     <p:spTree>
       <p:nvGrpSpPr>
@@ -2749,9 +2717,7 @@
               <a:defRPr sz="3600"/>
             </a:lvl9pPr>
           </a:lstStyle>
-          <a:p>
-            <a:endParaRPr/>
-          </a:p>
+          <a:p/>
         </p:txBody>
       </p:sp>
       <p:sp>
@@ -2826,10 +2792,9 @@
               <a:buNone/>
             </a:pPr>
             <a:fld id="{00000000-1234-1234-1234-123412341234}" type="slidenum">
-              <a:rPr lang="ko"/>
-              <a:t>‹#›</a:t>
+              <a:rPr lang="en-US"/>
             </a:fld>
-            <a:endParaRPr/>
+            <a:endParaRPr lang="en-US"/>
           </a:p>
         </p:txBody>
       </p:sp>
@@ -2842,7 +2807,7 @@
 </file>
 
 <file path=ppt/slideLayouts/slideLayout3.xml><?xml version="1.0" encoding="utf-8"?>
-<p:sldLayout xmlns:a="http://schemas.openxmlformats.org/drawingml/2006/main" xmlns:r="http://schemas.openxmlformats.org/officeDocument/2006/relationships" xmlns:p="http://schemas.openxmlformats.org/presentationml/2006/main" matchingName="Title and body" type="tx">
+<p:sldLayout xmlns:a="http://schemas.openxmlformats.org/drawingml/2006/main" xmlns:r="http://schemas.openxmlformats.org/officeDocument/2006/relationships" xmlns:p="http://schemas.openxmlformats.org/presentationml/2006/main" type="tx" matchingName="Title and body">
   <p:cSld name="TITLE_AND_BODY">
     <p:spTree>
       <p:nvGrpSpPr>
@@ -2982,9 +2947,7 @@
               <a:defRPr/>
             </a:lvl9pPr>
           </a:lstStyle>
-          <a:p>
-            <a:endParaRPr/>
-          </a:p>
+          <a:p/>
         </p:txBody>
       </p:sp>
       <p:sp>
@@ -3111,9 +3074,7 @@
               <a:defRPr/>
             </a:lvl9pPr>
           </a:lstStyle>
-          <a:p>
-            <a:endParaRPr/>
-          </a:p>
+          <a:p/>
         </p:txBody>
       </p:sp>
       <p:sp>
@@ -3188,10 +3149,9 @@
               <a:buNone/>
             </a:pPr>
             <a:fld id="{00000000-1234-1234-1234-123412341234}" type="slidenum">
-              <a:rPr lang="ko"/>
-              <a:t>‹#›</a:t>
+              <a:rPr lang="en-US"/>
             </a:fld>
-            <a:endParaRPr/>
+            <a:endParaRPr lang="en-US"/>
           </a:p>
         </p:txBody>
       </p:sp>
@@ -3204,7 +3164,7 @@
 </file>
 
 <file path=ppt/slideLayouts/slideLayout4.xml><?xml version="1.0" encoding="utf-8"?>
-<p:sldLayout xmlns:a="http://schemas.openxmlformats.org/drawingml/2006/main" xmlns:r="http://schemas.openxmlformats.org/officeDocument/2006/relationships" xmlns:p="http://schemas.openxmlformats.org/presentationml/2006/main" matchingName="Title and two columns" type="twoColTx">
+<p:sldLayout xmlns:a="http://schemas.openxmlformats.org/drawingml/2006/main" xmlns:r="http://schemas.openxmlformats.org/officeDocument/2006/relationships" xmlns:p="http://schemas.openxmlformats.org/presentationml/2006/main" type="twoColTx" matchingName="Title and two columns">
   <p:cSld name="TITLE_AND_TWO_COLUMNS">
     <p:spTree>
       <p:nvGrpSpPr>
@@ -3344,9 +3304,7 @@
               <a:defRPr/>
             </a:lvl9pPr>
           </a:lstStyle>
-          <a:p>
-            <a:endParaRPr/>
-          </a:p>
+          <a:p/>
         </p:txBody>
       </p:sp>
       <p:sp>
@@ -3473,9 +3431,7 @@
               <a:defRPr sz="1200"/>
             </a:lvl9pPr>
           </a:lstStyle>
-          <a:p>
-            <a:endParaRPr/>
-          </a:p>
+          <a:p/>
         </p:txBody>
       </p:sp>
       <p:sp>
@@ -3602,9 +3558,7 @@
               <a:defRPr sz="1200"/>
             </a:lvl9pPr>
           </a:lstStyle>
-          <a:p>
-            <a:endParaRPr/>
-          </a:p>
+          <a:p/>
         </p:txBody>
       </p:sp>
       <p:sp>
@@ -3679,10 +3633,9 @@
               <a:buNone/>
             </a:pPr>
             <a:fld id="{00000000-1234-1234-1234-123412341234}" type="slidenum">
-              <a:rPr lang="ko"/>
-              <a:t>‹#›</a:t>
+              <a:rPr lang="en-US"/>
             </a:fld>
-            <a:endParaRPr/>
+            <a:endParaRPr lang="en-US"/>
           </a:p>
         </p:txBody>
       </p:sp>
@@ -3695,7 +3648,7 @@
 </file>
 
 <file path=ppt/slideLayouts/slideLayout5.xml><?xml version="1.0" encoding="utf-8"?>
-<p:sldLayout xmlns:a="http://schemas.openxmlformats.org/drawingml/2006/main" xmlns:r="http://schemas.openxmlformats.org/officeDocument/2006/relationships" xmlns:p="http://schemas.openxmlformats.org/presentationml/2006/main" matchingName="Title only" type="titleOnly">
+<p:sldLayout xmlns:a="http://schemas.openxmlformats.org/drawingml/2006/main" xmlns:r="http://schemas.openxmlformats.org/officeDocument/2006/relationships" xmlns:p="http://schemas.openxmlformats.org/presentationml/2006/main" type="titleOnly" matchingName="Title only">
   <p:cSld name="TITLE_ONLY">
     <p:spTree>
       <p:nvGrpSpPr>
@@ -3835,9 +3788,7 @@
               <a:defRPr/>
             </a:lvl9pPr>
           </a:lstStyle>
-          <a:p>
-            <a:endParaRPr/>
-          </a:p>
+          <a:p/>
         </p:txBody>
       </p:sp>
       <p:sp>
@@ -3912,10 +3863,9 @@
               <a:buNone/>
             </a:pPr>
             <a:fld id="{00000000-1234-1234-1234-123412341234}" type="slidenum">
-              <a:rPr lang="ko"/>
-              <a:t>‹#›</a:t>
+              <a:rPr lang="en-US"/>
             </a:fld>
-            <a:endParaRPr/>
+            <a:endParaRPr lang="en-US"/>
           </a:p>
         </p:txBody>
       </p:sp>
@@ -4068,9 +4018,7 @@
               <a:defRPr sz="2400"/>
             </a:lvl9pPr>
           </a:lstStyle>
-          <a:p>
-            <a:endParaRPr/>
-          </a:p>
+          <a:p/>
         </p:txBody>
       </p:sp>
       <p:sp>
@@ -4197,9 +4145,7 @@
               <a:defRPr sz="1200"/>
             </a:lvl9pPr>
           </a:lstStyle>
-          <a:p>
-            <a:endParaRPr/>
-          </a:p>
+          <a:p/>
         </p:txBody>
       </p:sp>
       <p:sp>
@@ -4274,10 +4220,9 @@
               <a:buNone/>
             </a:pPr>
             <a:fld id="{00000000-1234-1234-1234-123412341234}" type="slidenum">
-              <a:rPr lang="ko"/>
-              <a:t>‹#›</a:t>
+              <a:rPr lang="en-US"/>
             </a:fld>
-            <a:endParaRPr/>
+            <a:endParaRPr lang="en-US"/>
           </a:p>
         </p:txBody>
       </p:sp>
@@ -4430,9 +4375,7 @@
               <a:defRPr sz="4800"/>
             </a:lvl9pPr>
           </a:lstStyle>
-          <a:p>
-            <a:endParaRPr/>
-          </a:p>
+          <a:p/>
         </p:txBody>
       </p:sp>
       <p:sp>
@@ -4507,10 +4450,9 @@
               <a:buNone/>
             </a:pPr>
             <a:fld id="{00000000-1234-1234-1234-123412341234}" type="slidenum">
-              <a:rPr lang="ko"/>
-              <a:t>‹#›</a:t>
+              <a:rPr lang="en-US"/>
             </a:fld>
-            <a:endParaRPr/>
+            <a:endParaRPr lang="en-US"/>
           </a:p>
         </p:txBody>
       </p:sp>
@@ -4575,7 +4517,6 @@
               </a:spcAft>
               <a:buNone/>
             </a:pPr>
-            <a:endParaRPr/>
           </a:p>
         </p:txBody>
       </p:sp>
@@ -4703,9 +4644,7 @@
               <a:defRPr sz="4200"/>
             </a:lvl9pPr>
           </a:lstStyle>
-          <a:p>
-            <a:endParaRPr/>
-          </a:p>
+          <a:p/>
         </p:txBody>
       </p:sp>
       <p:sp>
@@ -4859,9 +4798,7 @@
               <a:defRPr sz="2100"/>
             </a:lvl9pPr>
           </a:lstStyle>
-          <a:p>
-            <a:endParaRPr/>
-          </a:p>
+          <a:p/>
         </p:txBody>
       </p:sp>
       <p:sp>
@@ -4988,9 +4925,7 @@
               <a:defRPr/>
             </a:lvl9pPr>
           </a:lstStyle>
-          <a:p>
-            <a:endParaRPr/>
-          </a:p>
+          <a:p/>
         </p:txBody>
       </p:sp>
       <p:sp>
@@ -5065,10 +5000,9 @@
               <a:buNone/>
             </a:pPr>
             <a:fld id="{00000000-1234-1234-1234-123412341234}" type="slidenum">
-              <a:rPr lang="ko"/>
-              <a:t>‹#›</a:t>
+              <a:rPr lang="en-US"/>
             </a:fld>
-            <a:endParaRPr/>
+            <a:endParaRPr lang="en-US"/>
           </a:p>
         </p:txBody>
       </p:sp>
@@ -5136,9 +5070,7 @@
               <a:defRPr/>
             </a:lvl1pPr>
           </a:lstStyle>
-          <a:p>
-            <a:endParaRPr/>
-          </a:p>
+          <a:p/>
         </p:txBody>
       </p:sp>
       <p:sp>
@@ -5213,10 +5145,9 @@
               <a:buNone/>
             </a:pPr>
             <a:fld id="{00000000-1234-1234-1234-123412341234}" type="slidenum">
-              <a:rPr lang="ko"/>
-              <a:t>‹#›</a:t>
+              <a:rPr lang="en-US"/>
             </a:fld>
-            <a:endParaRPr/>
+            <a:endParaRPr lang="en-US"/>
           </a:p>
         </p:txBody>
       </p:sp>
@@ -5230,7 +5161,7 @@
 
 <file path=ppt/slideMasters/slideMaster1.xml><?xml version="1.0" encoding="utf-8"?>
 <p:sldMaster xmlns:a="http://schemas.openxmlformats.org/drawingml/2006/main" xmlns:r="http://schemas.openxmlformats.org/officeDocument/2006/relationships" xmlns:p="http://schemas.openxmlformats.org/presentationml/2006/main">
-  <p:cSld name="simple-light-2">
+  <p:cSld>
     <p:bg>
       <p:bgPr>
         <a:solidFill>
@@ -5444,9 +5375,7 @@
               </a:defRPr>
             </a:lvl9pPr>
           </a:lstStyle>
-          <a:p>
-            <a:endParaRPr/>
-          </a:p>
+          <a:p/>
         </p:txBody>
       </p:sp>
       <p:sp>
@@ -5667,9 +5596,7 @@
               </a:defRPr>
             </a:lvl9pPr>
           </a:lstStyle>
-          <a:p>
-            <a:endParaRPr/>
-          </a:p>
+          <a:p/>
         </p:txBody>
       </p:sp>
       <p:sp>
@@ -5784,10 +5711,9 @@
               <a:buNone/>
             </a:pPr>
             <a:fld id="{00000000-1234-1234-1234-123412341234}" type="slidenum">
-              <a:rPr lang="ko"/>
-              <a:t>‹#›</a:t>
+              <a:rPr lang="en-US"/>
             </a:fld>
-            <a:endParaRPr/>
+            <a:endParaRPr lang="en-US"/>
           </a:p>
         </p:txBody>
       </p:sp>
@@ -5795,17 +5721,17 @@
   </p:cSld>
   <p:clrMap bg1="lt1" tx1="dk1" bg2="dk2" tx2="lt2" accent1="accent1" accent2="accent2" accent3="accent3" accent4="accent4" accent5="accent5" accent6="accent6" hlink="hlink" folHlink="folHlink"/>
   <p:sldLayoutIdLst>
-    <p:sldLayoutId id="2147483648" r:id="rId1"/>
-    <p:sldLayoutId id="2147483649" r:id="rId2"/>
-    <p:sldLayoutId id="2147483650" r:id="rId3"/>
-    <p:sldLayoutId id="2147483651" r:id="rId4"/>
-    <p:sldLayoutId id="2147483652" r:id="rId5"/>
-    <p:sldLayoutId id="2147483653" r:id="rId6"/>
-    <p:sldLayoutId id="2147483654" r:id="rId7"/>
-    <p:sldLayoutId id="2147483655" r:id="rId8"/>
-    <p:sldLayoutId id="2147483656" r:id="rId9"/>
-    <p:sldLayoutId id="2147483657" r:id="rId10"/>
-    <p:sldLayoutId id="2147483658" r:id="rId11"/>
+    <p:sldLayoutId id="2147483649" r:id="rId1"/>
+    <p:sldLayoutId id="2147483650" r:id="rId2"/>
+    <p:sldLayoutId id="2147483651" r:id="rId3"/>
+    <p:sldLayoutId id="2147483652" r:id="rId4"/>
+    <p:sldLayoutId id="2147483653" r:id="rId5"/>
+    <p:sldLayoutId id="2147483654" r:id="rId6"/>
+    <p:sldLayoutId id="2147483655" r:id="rId7"/>
+    <p:sldLayoutId id="2147483656" r:id="rId8"/>
+    <p:sldLayoutId id="2147483657" r:id="rId9"/>
+    <p:sldLayoutId id="2147483658" r:id="rId10"/>
+    <p:sldLayoutId id="2147483659" r:id="rId11"/>
   </p:sldLayoutIdLst>
   <p:hf sldNum="0" hdr="0" ftr="0" dt="0"/>
   <p:txStyles>
@@ -5834,15 +5760,15 @@
         <a:buClr>
           <a:srgbClr val="000000"/>
         </a:buClr>
-        <a:buFont typeface="Arial"/>
+        <a:buFont typeface="Arial" panose="020B0604020202020204"/>
         <a:defRPr sz="1400" b="0" i="0" u="none" strike="noStrike" cap="none">
           <a:solidFill>
             <a:srgbClr val="000000"/>
           </a:solidFill>
-          <a:latin typeface="Arial"/>
-          <a:ea typeface="Arial"/>
-          <a:cs typeface="Arial"/>
-          <a:sym typeface="Arial"/>
+          <a:latin typeface="Arial" panose="020B0604020202020204"/>
+          <a:ea typeface="Arial" panose="020B0604020202020204"/>
+          <a:cs typeface="Arial" panose="020B0604020202020204"/>
+          <a:sym typeface="Arial" panose="020B0604020202020204"/>
         </a:defRPr>
       </a:lvl1pPr>
       <a:lvl2pPr marR="0" lvl="1" algn="l" rtl="0">
@@ -5858,15 +5784,15 @@
         <a:buClr>
           <a:srgbClr val="000000"/>
         </a:buClr>
-        <a:buFont typeface="Arial"/>
+        <a:buFont typeface="Arial" panose="020B0604020202020204"/>
         <a:defRPr sz="1400" b="0" i="0" u="none" strike="noStrike" cap="none">
           <a:solidFill>
             <a:srgbClr val="000000"/>
           </a:solidFill>
-          <a:latin typeface="Arial"/>
-          <a:ea typeface="Arial"/>
-          <a:cs typeface="Arial"/>
-          <a:sym typeface="Arial"/>
+          <a:latin typeface="Arial" panose="020B0604020202020204"/>
+          <a:ea typeface="Arial" panose="020B0604020202020204"/>
+          <a:cs typeface="Arial" panose="020B0604020202020204"/>
+          <a:sym typeface="Arial" panose="020B0604020202020204"/>
         </a:defRPr>
       </a:lvl2pPr>
       <a:lvl3pPr marR="0" lvl="2" algn="l" rtl="0">
@@ -5882,15 +5808,15 @@
         <a:buClr>
           <a:srgbClr val="000000"/>
         </a:buClr>
-        <a:buFont typeface="Arial"/>
+        <a:buFont typeface="Arial" panose="020B0604020202020204"/>
         <a:defRPr sz="1400" b="0" i="0" u="none" strike="noStrike" cap="none">
           <a:solidFill>
             <a:srgbClr val="000000"/>
           </a:solidFill>
-          <a:latin typeface="Arial"/>
-          <a:ea typeface="Arial"/>
-          <a:cs typeface="Arial"/>
-          <a:sym typeface="Arial"/>
+          <a:latin typeface="Arial" panose="020B0604020202020204"/>
+          <a:ea typeface="Arial" panose="020B0604020202020204"/>
+          <a:cs typeface="Arial" panose="020B0604020202020204"/>
+          <a:sym typeface="Arial" panose="020B0604020202020204"/>
         </a:defRPr>
       </a:lvl3pPr>
       <a:lvl4pPr marR="0" lvl="3" algn="l" rtl="0">
@@ -5906,15 +5832,15 @@
         <a:buClr>
           <a:srgbClr val="000000"/>
         </a:buClr>
-        <a:buFont typeface="Arial"/>
+        <a:buFont typeface="Arial" panose="020B0604020202020204"/>
         <a:defRPr sz="1400" b="0" i="0" u="none" strike="noStrike" cap="none">
           <a:solidFill>
             <a:srgbClr val="000000"/>
           </a:solidFill>
-          <a:latin typeface="Arial"/>
-          <a:ea typeface="Arial"/>
-          <a:cs typeface="Arial"/>
-          <a:sym typeface="Arial"/>
+          <a:latin typeface="Arial" panose="020B0604020202020204"/>
+          <a:ea typeface="Arial" panose="020B0604020202020204"/>
+          <a:cs typeface="Arial" panose="020B0604020202020204"/>
+          <a:sym typeface="Arial" panose="020B0604020202020204"/>
         </a:defRPr>
       </a:lvl4pPr>
       <a:lvl5pPr marR="0" lvl="4" algn="l" rtl="0">
@@ -5930,15 +5856,15 @@
         <a:buClr>
           <a:srgbClr val="000000"/>
         </a:buClr>
-        <a:buFont typeface="Arial"/>
+        <a:buFont typeface="Arial" panose="020B0604020202020204"/>
         <a:defRPr sz="1400" b="0" i="0" u="none" strike="noStrike" cap="none">
           <a:solidFill>
             <a:srgbClr val="000000"/>
           </a:solidFill>
-          <a:latin typeface="Arial"/>
-          <a:ea typeface="Arial"/>
-          <a:cs typeface="Arial"/>
-          <a:sym typeface="Arial"/>
+          <a:latin typeface="Arial" panose="020B0604020202020204"/>
+          <a:ea typeface="Arial" panose="020B0604020202020204"/>
+          <a:cs typeface="Arial" panose="020B0604020202020204"/>
+          <a:sym typeface="Arial" panose="020B0604020202020204"/>
         </a:defRPr>
       </a:lvl5pPr>
       <a:lvl6pPr marR="0" lvl="5" algn="l" rtl="0">
@@ -5954,15 +5880,15 @@
         <a:buClr>
           <a:srgbClr val="000000"/>
         </a:buClr>
-        <a:buFont typeface="Arial"/>
+        <a:buFont typeface="Arial" panose="020B0604020202020204"/>
         <a:defRPr sz="1400" b="0" i="0" u="none" strike="noStrike" cap="none">
           <a:solidFill>
             <a:srgbClr val="000000"/>
           </a:solidFill>
-          <a:latin typeface="Arial"/>
-          <a:ea typeface="Arial"/>
-          <a:cs typeface="Arial"/>
-          <a:sym typeface="Arial"/>
+          <a:latin typeface="Arial" panose="020B0604020202020204"/>
+          <a:ea typeface="Arial" panose="020B0604020202020204"/>
+          <a:cs typeface="Arial" panose="020B0604020202020204"/>
+          <a:sym typeface="Arial" panose="020B0604020202020204"/>
         </a:defRPr>
       </a:lvl6pPr>
       <a:lvl7pPr marR="0" lvl="6" algn="l" rtl="0">
@@ -5978,15 +5904,15 @@
         <a:buClr>
           <a:srgbClr val="000000"/>
         </a:buClr>
-        <a:buFont typeface="Arial"/>
+        <a:buFont typeface="Arial" panose="020B0604020202020204"/>
         <a:defRPr sz="1400" b="0" i="0" u="none" strike="noStrike" cap="none">
           <a:solidFill>
             <a:srgbClr val="000000"/>
           </a:solidFill>
-          <a:latin typeface="Arial"/>
-          <a:ea typeface="Arial"/>
-          <a:cs typeface="Arial"/>
-          <a:sym typeface="Arial"/>
+          <a:latin typeface="Arial" panose="020B0604020202020204"/>
+          <a:ea typeface="Arial" panose="020B0604020202020204"/>
+          <a:cs typeface="Arial" panose="020B0604020202020204"/>
+          <a:sym typeface="Arial" panose="020B0604020202020204"/>
         </a:defRPr>
       </a:lvl7pPr>
       <a:lvl8pPr marR="0" lvl="7" algn="l" rtl="0">
@@ -6002,15 +5928,15 @@
         <a:buClr>
           <a:srgbClr val="000000"/>
         </a:buClr>
-        <a:buFont typeface="Arial"/>
+        <a:buFont typeface="Arial" panose="020B0604020202020204"/>
         <a:defRPr sz="1400" b="0" i="0" u="none" strike="noStrike" cap="none">
           <a:solidFill>
             <a:srgbClr val="000000"/>
           </a:solidFill>
-          <a:latin typeface="Arial"/>
-          <a:ea typeface="Arial"/>
-          <a:cs typeface="Arial"/>
-          <a:sym typeface="Arial"/>
+          <a:latin typeface="Arial" panose="020B0604020202020204"/>
+          <a:ea typeface="Arial" panose="020B0604020202020204"/>
+          <a:cs typeface="Arial" panose="020B0604020202020204"/>
+          <a:sym typeface="Arial" panose="020B0604020202020204"/>
         </a:defRPr>
       </a:lvl8pPr>
       <a:lvl9pPr marR="0" lvl="8" algn="l" rtl="0">
@@ -6026,15 +5952,15 @@
         <a:buClr>
           <a:srgbClr val="000000"/>
         </a:buClr>
-        <a:buFont typeface="Arial"/>
+        <a:buFont typeface="Arial" panose="020B0604020202020204"/>
         <a:defRPr sz="1400" b="0" i="0" u="none" strike="noStrike" cap="none">
           <a:solidFill>
             <a:srgbClr val="000000"/>
           </a:solidFill>
-          <a:latin typeface="Arial"/>
-          <a:ea typeface="Arial"/>
-          <a:cs typeface="Arial"/>
-          <a:sym typeface="Arial"/>
+          <a:latin typeface="Arial" panose="020B0604020202020204"/>
+          <a:ea typeface="Arial" panose="020B0604020202020204"/>
+          <a:cs typeface="Arial" panose="020B0604020202020204"/>
+          <a:sym typeface="Arial" panose="020B0604020202020204"/>
         </a:defRPr>
       </a:lvl9pPr>
     </p:titleStyle>
@@ -6063,15 +5989,15 @@
         <a:buClr>
           <a:srgbClr val="000000"/>
         </a:buClr>
-        <a:buFont typeface="Arial"/>
+        <a:buFont typeface="Arial" panose="020B0604020202020204"/>
         <a:defRPr sz="1400" b="0" i="0" u="none" strike="noStrike" cap="none">
           <a:solidFill>
             <a:srgbClr val="000000"/>
           </a:solidFill>
-          <a:latin typeface="Arial"/>
-          <a:ea typeface="Arial"/>
-          <a:cs typeface="Arial"/>
-          <a:sym typeface="Arial"/>
+          <a:latin typeface="Arial" panose="020B0604020202020204"/>
+          <a:ea typeface="Arial" panose="020B0604020202020204"/>
+          <a:cs typeface="Arial" panose="020B0604020202020204"/>
+          <a:sym typeface="Arial" panose="020B0604020202020204"/>
         </a:defRPr>
       </a:lvl1pPr>
       <a:lvl2pPr marR="0" lvl="1" algn="l" rtl="0">
@@ -6087,15 +6013,15 @@
         <a:buClr>
           <a:srgbClr val="000000"/>
         </a:buClr>
-        <a:buFont typeface="Arial"/>
+        <a:buFont typeface="Arial" panose="020B0604020202020204"/>
         <a:defRPr sz="1400" b="0" i="0" u="none" strike="noStrike" cap="none">
           <a:solidFill>
             <a:srgbClr val="000000"/>
           </a:solidFill>
-          <a:latin typeface="Arial"/>
-          <a:ea typeface="Arial"/>
-          <a:cs typeface="Arial"/>
-          <a:sym typeface="Arial"/>
+          <a:latin typeface="Arial" panose="020B0604020202020204"/>
+          <a:ea typeface="Arial" panose="020B0604020202020204"/>
+          <a:cs typeface="Arial" panose="020B0604020202020204"/>
+          <a:sym typeface="Arial" panose="020B0604020202020204"/>
         </a:defRPr>
       </a:lvl2pPr>
       <a:lvl3pPr marR="0" lvl="2" algn="l" rtl="0">
@@ -6111,15 +6037,15 @@
         <a:buClr>
           <a:srgbClr val="000000"/>
         </a:buClr>
-        <a:buFont typeface="Arial"/>
+        <a:buFont typeface="Arial" panose="020B0604020202020204"/>
         <a:defRPr sz="1400" b="0" i="0" u="none" strike="noStrike" cap="none">
           <a:solidFill>
             <a:srgbClr val="000000"/>
           </a:solidFill>
-          <a:latin typeface="Arial"/>
-          <a:ea typeface="Arial"/>
-          <a:cs typeface="Arial"/>
-          <a:sym typeface="Arial"/>
+          <a:latin typeface="Arial" panose="020B0604020202020204"/>
+          <a:ea typeface="Arial" panose="020B0604020202020204"/>
+          <a:cs typeface="Arial" panose="020B0604020202020204"/>
+          <a:sym typeface="Arial" panose="020B0604020202020204"/>
         </a:defRPr>
       </a:lvl3pPr>
       <a:lvl4pPr marR="0" lvl="3" algn="l" rtl="0">
@@ -6135,15 +6061,15 @@
         <a:buClr>
           <a:srgbClr val="000000"/>
         </a:buClr>
-        <a:buFont typeface="Arial"/>
+        <a:buFont typeface="Arial" panose="020B0604020202020204"/>
         <a:defRPr sz="1400" b="0" i="0" u="none" strike="noStrike" cap="none">
           <a:solidFill>
             <a:srgbClr val="000000"/>
           </a:solidFill>
-          <a:latin typeface="Arial"/>
-          <a:ea typeface="Arial"/>
-          <a:cs typeface="Arial"/>
-          <a:sym typeface="Arial"/>
+          <a:latin typeface="Arial" panose="020B0604020202020204"/>
+          <a:ea typeface="Arial" panose="020B0604020202020204"/>
+          <a:cs typeface="Arial" panose="020B0604020202020204"/>
+          <a:sym typeface="Arial" panose="020B0604020202020204"/>
         </a:defRPr>
       </a:lvl4pPr>
       <a:lvl5pPr marR="0" lvl="4" algn="l" rtl="0">
@@ -6159,15 +6085,15 @@
         <a:buClr>
           <a:srgbClr val="000000"/>
         </a:buClr>
-        <a:buFont typeface="Arial"/>
+        <a:buFont typeface="Arial" panose="020B0604020202020204"/>
         <a:defRPr sz="1400" b="0" i="0" u="none" strike="noStrike" cap="none">
           <a:solidFill>
             <a:srgbClr val="000000"/>
           </a:solidFill>
-          <a:latin typeface="Arial"/>
-          <a:ea typeface="Arial"/>
-          <a:cs typeface="Arial"/>
-          <a:sym typeface="Arial"/>
+          <a:latin typeface="Arial" panose="020B0604020202020204"/>
+          <a:ea typeface="Arial" panose="020B0604020202020204"/>
+          <a:cs typeface="Arial" panose="020B0604020202020204"/>
+          <a:sym typeface="Arial" panose="020B0604020202020204"/>
         </a:defRPr>
       </a:lvl5pPr>
       <a:lvl6pPr marR="0" lvl="5" algn="l" rtl="0">
@@ -6183,15 +6109,15 @@
         <a:buClr>
           <a:srgbClr val="000000"/>
         </a:buClr>
-        <a:buFont typeface="Arial"/>
+        <a:buFont typeface="Arial" panose="020B0604020202020204"/>
         <a:defRPr sz="1400" b="0" i="0" u="none" strike="noStrike" cap="none">
           <a:solidFill>
             <a:srgbClr val="000000"/>
           </a:solidFill>
-          <a:latin typeface="Arial"/>
-          <a:ea typeface="Arial"/>
-          <a:cs typeface="Arial"/>
-          <a:sym typeface="Arial"/>
+          <a:latin typeface="Arial" panose="020B0604020202020204"/>
+          <a:ea typeface="Arial" panose="020B0604020202020204"/>
+          <a:cs typeface="Arial" panose="020B0604020202020204"/>
+          <a:sym typeface="Arial" panose="020B0604020202020204"/>
         </a:defRPr>
       </a:lvl6pPr>
       <a:lvl7pPr marR="0" lvl="6" algn="l" rtl="0">
@@ -6207,15 +6133,15 @@
         <a:buClr>
           <a:srgbClr val="000000"/>
         </a:buClr>
-        <a:buFont typeface="Arial"/>
+        <a:buFont typeface="Arial" panose="020B0604020202020204"/>
         <a:defRPr sz="1400" b="0" i="0" u="none" strike="noStrike" cap="none">
           <a:solidFill>
             <a:srgbClr val="000000"/>
           </a:solidFill>
-          <a:latin typeface="Arial"/>
-          <a:ea typeface="Arial"/>
-          <a:cs typeface="Arial"/>
-          <a:sym typeface="Arial"/>
+          <a:latin typeface="Arial" panose="020B0604020202020204"/>
+          <a:ea typeface="Arial" panose="020B0604020202020204"/>
+          <a:cs typeface="Arial" panose="020B0604020202020204"/>
+          <a:sym typeface="Arial" panose="020B0604020202020204"/>
         </a:defRPr>
       </a:lvl7pPr>
       <a:lvl8pPr marR="0" lvl="7" algn="l" rtl="0">
@@ -6231,15 +6157,15 @@
         <a:buClr>
           <a:srgbClr val="000000"/>
         </a:buClr>
-        <a:buFont typeface="Arial"/>
+        <a:buFont typeface="Arial" panose="020B0604020202020204"/>
         <a:defRPr sz="1400" b="0" i="0" u="none" strike="noStrike" cap="none">
           <a:solidFill>
             <a:srgbClr val="000000"/>
           </a:solidFill>
-          <a:latin typeface="Arial"/>
-          <a:ea typeface="Arial"/>
-          <a:cs typeface="Arial"/>
-          <a:sym typeface="Arial"/>
+          <a:latin typeface="Arial" panose="020B0604020202020204"/>
+          <a:ea typeface="Arial" panose="020B0604020202020204"/>
+          <a:cs typeface="Arial" panose="020B0604020202020204"/>
+          <a:sym typeface="Arial" panose="020B0604020202020204"/>
         </a:defRPr>
       </a:lvl8pPr>
       <a:lvl9pPr marR="0" lvl="8" algn="l" rtl="0">
@@ -6255,15 +6181,15 @@
         <a:buClr>
           <a:srgbClr val="000000"/>
         </a:buClr>
-        <a:buFont typeface="Arial"/>
+        <a:buFont typeface="Arial" panose="020B0604020202020204"/>
         <a:defRPr sz="1400" b="0" i="0" u="none" strike="noStrike" cap="none">
           <a:solidFill>
             <a:srgbClr val="000000"/>
           </a:solidFill>
-          <a:latin typeface="Arial"/>
-          <a:ea typeface="Arial"/>
-          <a:cs typeface="Arial"/>
-          <a:sym typeface="Arial"/>
+          <a:latin typeface="Arial" panose="020B0604020202020204"/>
+          <a:ea typeface="Arial" panose="020B0604020202020204"/>
+          <a:cs typeface="Arial" panose="020B0604020202020204"/>
+          <a:sym typeface="Arial" panose="020B0604020202020204"/>
         </a:defRPr>
       </a:lvl9pPr>
     </p:bodyStyle>
@@ -6292,15 +6218,15 @@
         <a:buClr>
           <a:srgbClr val="000000"/>
         </a:buClr>
-        <a:buFont typeface="Arial"/>
+        <a:buFont typeface="Arial" panose="020B0604020202020204"/>
         <a:defRPr sz="1400" b="0" i="0" u="none" strike="noStrike" cap="none">
           <a:solidFill>
             <a:srgbClr val="000000"/>
           </a:solidFill>
-          <a:latin typeface="Arial"/>
-          <a:ea typeface="Arial"/>
-          <a:cs typeface="Arial"/>
-          <a:sym typeface="Arial"/>
+          <a:latin typeface="Arial" panose="020B0604020202020204"/>
+          <a:ea typeface="Arial" panose="020B0604020202020204"/>
+          <a:cs typeface="Arial" panose="020B0604020202020204"/>
+          <a:sym typeface="Arial" panose="020B0604020202020204"/>
         </a:defRPr>
       </a:lvl1pPr>
       <a:lvl2pPr marR="0" lvl="1" algn="l" rtl="0">
@@ -6316,15 +6242,15 @@
         <a:buClr>
           <a:srgbClr val="000000"/>
         </a:buClr>
-        <a:buFont typeface="Arial"/>
+        <a:buFont typeface="Arial" panose="020B0604020202020204"/>
         <a:defRPr sz="1400" b="0" i="0" u="none" strike="noStrike" cap="none">
           <a:solidFill>
             <a:srgbClr val="000000"/>
           </a:solidFill>
-          <a:latin typeface="Arial"/>
-          <a:ea typeface="Arial"/>
-          <a:cs typeface="Arial"/>
-          <a:sym typeface="Arial"/>
+          <a:latin typeface="Arial" panose="020B0604020202020204"/>
+          <a:ea typeface="Arial" panose="020B0604020202020204"/>
+          <a:cs typeface="Arial" panose="020B0604020202020204"/>
+          <a:sym typeface="Arial" panose="020B0604020202020204"/>
         </a:defRPr>
       </a:lvl2pPr>
       <a:lvl3pPr marR="0" lvl="2" algn="l" rtl="0">
@@ -6340,15 +6266,15 @@
         <a:buClr>
           <a:srgbClr val="000000"/>
         </a:buClr>
-        <a:buFont typeface="Arial"/>
+        <a:buFont typeface="Arial" panose="020B0604020202020204"/>
         <a:defRPr sz="1400" b="0" i="0" u="none" strike="noStrike" cap="none">
           <a:solidFill>
             <a:srgbClr val="000000"/>
           </a:solidFill>
-          <a:latin typeface="Arial"/>
-          <a:ea typeface="Arial"/>
-          <a:cs typeface="Arial"/>
-          <a:sym typeface="Arial"/>
+          <a:latin typeface="Arial" panose="020B0604020202020204"/>
+          <a:ea typeface="Arial" panose="020B0604020202020204"/>
+          <a:cs typeface="Arial" panose="020B0604020202020204"/>
+          <a:sym typeface="Arial" panose="020B0604020202020204"/>
         </a:defRPr>
       </a:lvl3pPr>
       <a:lvl4pPr marR="0" lvl="3" algn="l" rtl="0">
@@ -6364,15 +6290,15 @@
         <a:buClr>
           <a:srgbClr val="000000"/>
         </a:buClr>
-        <a:buFont typeface="Arial"/>
+        <a:buFont typeface="Arial" panose="020B0604020202020204"/>
         <a:defRPr sz="1400" b="0" i="0" u="none" strike="noStrike" cap="none">
           <a:solidFill>
             <a:srgbClr val="000000"/>
           </a:solidFill>
-          <a:latin typeface="Arial"/>
-          <a:ea typeface="Arial"/>
-          <a:cs typeface="Arial"/>
-          <a:sym typeface="Arial"/>
+          <a:latin typeface="Arial" panose="020B0604020202020204"/>
+          <a:ea typeface="Arial" panose="020B0604020202020204"/>
+          <a:cs typeface="Arial" panose="020B0604020202020204"/>
+          <a:sym typeface="Arial" panose="020B0604020202020204"/>
         </a:defRPr>
       </a:lvl4pPr>
       <a:lvl5pPr marR="0" lvl="4" algn="l" rtl="0">
@@ -6388,15 +6314,15 @@
         <a:buClr>
           <a:srgbClr val="000000"/>
         </a:buClr>
-        <a:buFont typeface="Arial"/>
+        <a:buFont typeface="Arial" panose="020B0604020202020204"/>
         <a:defRPr sz="1400" b="0" i="0" u="none" strike="noStrike" cap="none">
           <a:solidFill>
             <a:srgbClr val="000000"/>
           </a:solidFill>
-          <a:latin typeface="Arial"/>
-          <a:ea typeface="Arial"/>
-          <a:cs typeface="Arial"/>
-          <a:sym typeface="Arial"/>
+          <a:latin typeface="Arial" panose="020B0604020202020204"/>
+          <a:ea typeface="Arial" panose="020B0604020202020204"/>
+          <a:cs typeface="Arial" panose="020B0604020202020204"/>
+          <a:sym typeface="Arial" panose="020B0604020202020204"/>
         </a:defRPr>
       </a:lvl5pPr>
       <a:lvl6pPr marR="0" lvl="5" algn="l" rtl="0">
@@ -6412,15 +6338,15 @@
         <a:buClr>
           <a:srgbClr val="000000"/>
         </a:buClr>
-        <a:buFont typeface="Arial"/>
+        <a:buFont typeface="Arial" panose="020B0604020202020204"/>
         <a:defRPr sz="1400" b="0" i="0" u="none" strike="noStrike" cap="none">
           <a:solidFill>
             <a:srgbClr val="000000"/>
           </a:solidFill>
-          <a:latin typeface="Arial"/>
-          <a:ea typeface="Arial"/>
-          <a:cs typeface="Arial"/>
-          <a:sym typeface="Arial"/>
+          <a:latin typeface="Arial" panose="020B0604020202020204"/>
+          <a:ea typeface="Arial" panose="020B0604020202020204"/>
+          <a:cs typeface="Arial" panose="020B0604020202020204"/>
+          <a:sym typeface="Arial" panose="020B0604020202020204"/>
         </a:defRPr>
       </a:lvl6pPr>
       <a:lvl7pPr marR="0" lvl="6" algn="l" rtl="0">
@@ -6436,15 +6362,15 @@
         <a:buClr>
           <a:srgbClr val="000000"/>
         </a:buClr>
-        <a:buFont typeface="Arial"/>
+        <a:buFont typeface="Arial" panose="020B0604020202020204"/>
         <a:defRPr sz="1400" b="0" i="0" u="none" strike="noStrike" cap="none">
           <a:solidFill>
             <a:srgbClr val="000000"/>
           </a:solidFill>
-          <a:latin typeface="Arial"/>
-          <a:ea typeface="Arial"/>
-          <a:cs typeface="Arial"/>
-          <a:sym typeface="Arial"/>
+          <a:latin typeface="Arial" panose="020B0604020202020204"/>
+          <a:ea typeface="Arial" panose="020B0604020202020204"/>
+          <a:cs typeface="Arial" panose="020B0604020202020204"/>
+          <a:sym typeface="Arial" panose="020B0604020202020204"/>
         </a:defRPr>
       </a:lvl7pPr>
       <a:lvl8pPr marR="0" lvl="7" algn="l" rtl="0">
@@ -6460,15 +6386,15 @@
         <a:buClr>
           <a:srgbClr val="000000"/>
         </a:buClr>
-        <a:buFont typeface="Arial"/>
+        <a:buFont typeface="Arial" panose="020B0604020202020204"/>
         <a:defRPr sz="1400" b="0" i="0" u="none" strike="noStrike" cap="none">
           <a:solidFill>
             <a:srgbClr val="000000"/>
           </a:solidFill>
-          <a:latin typeface="Arial"/>
-          <a:ea typeface="Arial"/>
-          <a:cs typeface="Arial"/>
-          <a:sym typeface="Arial"/>
+          <a:latin typeface="Arial" panose="020B0604020202020204"/>
+          <a:ea typeface="Arial" panose="020B0604020202020204"/>
+          <a:cs typeface="Arial" panose="020B0604020202020204"/>
+          <a:sym typeface="Arial" panose="020B0604020202020204"/>
         </a:defRPr>
       </a:lvl8pPr>
       <a:lvl9pPr marR="0" lvl="8" algn="l" rtl="0">
@@ -6484,15 +6410,15 @@
         <a:buClr>
           <a:srgbClr val="000000"/>
         </a:buClr>
-        <a:buFont typeface="Arial"/>
+        <a:buFont typeface="Arial" panose="020B0604020202020204"/>
         <a:defRPr sz="1400" b="0" i="0" u="none" strike="noStrike" cap="none">
           <a:solidFill>
             <a:srgbClr val="000000"/>
           </a:solidFill>
-          <a:latin typeface="Arial"/>
-          <a:ea typeface="Arial"/>
-          <a:cs typeface="Arial"/>
-          <a:sym typeface="Arial"/>
+          <a:latin typeface="Arial" panose="020B0604020202020204"/>
+          <a:ea typeface="Arial" panose="020B0604020202020204"/>
+          <a:cs typeface="Arial" panose="020B0604020202020204"/>
+          <a:sym typeface="Arial" panose="020B0604020202020204"/>
         </a:defRPr>
       </a:lvl9pPr>
     </p:otherStyle>
@@ -6573,10 +6499,10 @@
               <a:solidFill>
                 <a:srgbClr val="FFFFFF"/>
               </a:solidFill>
-              <a:latin typeface="Arial"/>
-              <a:ea typeface="Arial"/>
-              <a:cs typeface="Arial"/>
-              <a:sym typeface="Arial"/>
+              <a:latin typeface="Arial" panose="020B0604020202020204"/>
+              <a:ea typeface="Arial" panose="020B0604020202020204"/>
+              <a:cs typeface="Arial" panose="020B0604020202020204"/>
+              <a:sym typeface="Arial" panose="020B0604020202020204"/>
             </a:endParaRPr>
           </a:p>
         </p:txBody>
@@ -6621,10 +6547,10 @@
               <a:solidFill>
                 <a:srgbClr val="FFFFFF"/>
               </a:solidFill>
-              <a:latin typeface="Arial"/>
-              <a:ea typeface="Arial"/>
-              <a:cs typeface="Arial"/>
-              <a:sym typeface="Arial"/>
+              <a:latin typeface="Arial" panose="020B0604020202020204"/>
+              <a:ea typeface="Arial" panose="020B0604020202020204"/>
+              <a:cs typeface="Arial" panose="020B0604020202020204"/>
+              <a:sym typeface="Arial" panose="020B0604020202020204"/>
             </a:endParaRPr>
           </a:p>
         </p:txBody>
@@ -6681,13 +6607,7 @@
       </p:sp>
       <p:sp>
         <p:nvSpPr>
-          <p:cNvPr id="15" name="Google Shape;97;p16">
-            <a:extLst>
-              <a:ext uri="{FF2B5EF4-FFF2-40B4-BE49-F238E27FC236}">
-                <a16:creationId xmlns:a16="http://schemas.microsoft.com/office/drawing/2014/main" id="{49C09F75-86FD-4A32-8287-65D0BBA5FEED}"/>
-              </a:ext>
-            </a:extLst>
-          </p:cNvPr>
+          <p:cNvPr id="15" name="Google Shape;97;p16"/>
           <p:cNvSpPr txBox="1"/>
           <p:nvPr/>
         </p:nvSpPr>
@@ -6815,11 +6735,11 @@
           <p:nvPr/>
         </p:nvPicPr>
         <p:blipFill rotWithShape="1">
-          <a:blip r:embed="rId3">
-            <a:alphaModFix/>
-          </a:blip>
+          <a:blip r:embed="rId1"/>
           <a:srcRect l="183540" t="-116389" r="-183540" b="167756"/>
-          <a:stretch/>
+          <a:stretch>
+            <a:fillRect/>
+          </a:stretch>
         </p:blipFill>
         <p:spPr>
           <a:xfrm>
@@ -6870,7 +6790,7 @@
               <a:buNone/>
             </a:pPr>
             <a:r>
-              <a:rPr lang="ko" sz="4800">
+              <a:rPr lang="en-US" sz="4800">
                 <a:solidFill>
                   <a:schemeClr val="lt1"/>
                 </a:solidFill>
@@ -6970,10 +6890,10 @@
               <a:solidFill>
                 <a:srgbClr val="FFFFFF"/>
               </a:solidFill>
-              <a:latin typeface="Arial"/>
-              <a:ea typeface="Arial"/>
-              <a:cs typeface="Arial"/>
-              <a:sym typeface="Arial"/>
+              <a:latin typeface="Arial" panose="020B0604020202020204"/>
+              <a:ea typeface="Arial" panose="020B0604020202020204"/>
+              <a:cs typeface="Arial" panose="020B0604020202020204"/>
+              <a:sym typeface="Arial" panose="020B0604020202020204"/>
             </a:endParaRPr>
           </a:p>
         </p:txBody>
@@ -7055,14 +6975,14 @@
                 <a:buNone/>
               </a:pPr>
               <a:r>
-                <a:rPr lang="en-US" altLang="ko" sz="5000" dirty="0">
+                <a:rPr lang="en-US" altLang="en-US" sz="5000" dirty="0">
                   <a:solidFill>
                     <a:schemeClr val="lt1"/>
                   </a:solidFill>
                 </a:rPr>
                 <a:t>01</a:t>
               </a:r>
-              <a:endParaRPr lang="ko" altLang="en-US" sz="5000" dirty="0">
+              <a:endParaRPr lang="en-US" altLang="en-US" sz="5000" dirty="0">
                 <a:solidFill>
                   <a:schemeClr val="lt1"/>
                 </a:solidFill>
@@ -7109,10 +7029,10 @@
                   <a:solidFill>
                     <a:schemeClr val="lt1"/>
                   </a:solidFill>
-                  <a:latin typeface="Malgun Gothic"/>
-                  <a:ea typeface="Malgun Gothic"/>
-                  <a:cs typeface="Malgun Gothic"/>
-                  <a:sym typeface="Malgun Gothic"/>
+                  <a:latin typeface="맑은 고딕" panose="020B0503020000020004" charset="-127"/>
+                  <a:ea typeface="맑은 고딕" panose="020B0503020000020004" charset="-127"/>
+                  <a:cs typeface="맑은 고딕" panose="020B0503020000020004" charset="-127"/>
+                  <a:sym typeface="맑은 고딕" panose="020B0503020000020004" charset="-127"/>
                 </a:rPr>
                 <a:t>프로젝트 프로세스</a:t>
               </a:r>
@@ -7120,10 +7040,10 @@
                 <a:solidFill>
                   <a:schemeClr val="lt1"/>
                 </a:solidFill>
-                <a:latin typeface="Malgun Gothic"/>
-                <a:ea typeface="Malgun Gothic"/>
-                <a:cs typeface="Malgun Gothic"/>
-                <a:sym typeface="Malgun Gothic"/>
+                <a:latin typeface="맑은 고딕" panose="020B0503020000020004" charset="-127"/>
+                <a:ea typeface="맑은 고딕" panose="020B0503020000020004" charset="-127"/>
+                <a:cs typeface="맑은 고딕" panose="020B0503020000020004" charset="-127"/>
+                <a:sym typeface="맑은 고딕" panose="020B0503020000020004" charset="-127"/>
               </a:endParaRPr>
             </a:p>
           </p:txBody>
@@ -7194,10 +7114,10 @@
               <a:solidFill>
                 <a:srgbClr val="FFFFFF"/>
               </a:solidFill>
-              <a:latin typeface="Arial"/>
-              <a:ea typeface="Arial"/>
-              <a:cs typeface="Arial"/>
-              <a:sym typeface="Arial"/>
+              <a:latin typeface="Arial" panose="020B0604020202020204"/>
+              <a:ea typeface="Arial" panose="020B0604020202020204"/>
+              <a:cs typeface="Arial" panose="020B0604020202020204"/>
+              <a:sym typeface="Arial" panose="020B0604020202020204"/>
             </a:endParaRPr>
           </a:p>
         </p:txBody>
@@ -7242,10 +7162,10 @@
               <a:solidFill>
                 <a:srgbClr val="FFFFFF"/>
               </a:solidFill>
-              <a:latin typeface="Arial"/>
-              <a:ea typeface="Arial"/>
-              <a:cs typeface="Arial"/>
-              <a:sym typeface="Arial"/>
+              <a:latin typeface="Arial" panose="020B0604020202020204"/>
+              <a:ea typeface="Arial" panose="020B0604020202020204"/>
+              <a:cs typeface="Arial" panose="020B0604020202020204"/>
+              <a:sym typeface="Arial" panose="020B0604020202020204"/>
             </a:endParaRPr>
           </a:p>
         </p:txBody>
@@ -7285,14 +7205,14 @@
               <a:buNone/>
             </a:pPr>
             <a:r>
-              <a:rPr lang="ko" sz="1500" dirty="0">
+              <a:rPr lang="en-US" sz="1500" dirty="0">
                 <a:solidFill>
                   <a:srgbClr val="3F3F3F"/>
                 </a:solidFill>
-                <a:latin typeface="Arial"/>
-                <a:ea typeface="Arial"/>
-                <a:cs typeface="Arial"/>
-                <a:sym typeface="Arial"/>
+                <a:latin typeface="Arial" panose="020B0604020202020204"/>
+                <a:ea typeface="Arial" panose="020B0604020202020204"/>
+                <a:cs typeface="Arial" panose="020B0604020202020204"/>
+                <a:sym typeface="Arial" panose="020B0604020202020204"/>
               </a:rPr>
               <a:t>PART 1</a:t>
             </a:r>
@@ -7300,10 +7220,10 @@
               <a:solidFill>
                 <a:srgbClr val="3F3F3F"/>
               </a:solidFill>
-              <a:latin typeface="Arial"/>
-              <a:ea typeface="Arial"/>
-              <a:cs typeface="Arial"/>
-              <a:sym typeface="Arial"/>
+              <a:latin typeface="Arial" panose="020B0604020202020204"/>
+              <a:ea typeface="Arial" panose="020B0604020202020204"/>
+              <a:cs typeface="Arial" panose="020B0604020202020204"/>
+              <a:sym typeface="Arial" panose="020B0604020202020204"/>
             </a:endParaRPr>
           </a:p>
         </p:txBody>
@@ -7348,10 +7268,10 @@
               <a:solidFill>
                 <a:srgbClr val="FFFFFF"/>
               </a:solidFill>
-              <a:latin typeface="Arial"/>
-              <a:ea typeface="Arial"/>
-              <a:cs typeface="Arial"/>
-              <a:sym typeface="Arial"/>
+              <a:latin typeface="Arial" panose="020B0604020202020204"/>
+              <a:ea typeface="Arial" panose="020B0604020202020204"/>
+              <a:cs typeface="Arial" panose="020B0604020202020204"/>
+              <a:sym typeface="Arial" panose="020B0604020202020204"/>
             </a:endParaRPr>
           </a:p>
         </p:txBody>
@@ -7397,10 +7317,10 @@
               <a:solidFill>
                 <a:srgbClr val="000000"/>
               </a:solidFill>
-              <a:latin typeface="Arial"/>
-              <a:ea typeface="Arial"/>
-              <a:cs typeface="Arial"/>
-              <a:sym typeface="Arial"/>
+              <a:latin typeface="Arial" panose="020B0604020202020204"/>
+              <a:ea typeface="Arial" panose="020B0604020202020204"/>
+              <a:cs typeface="Arial" panose="020B0604020202020204"/>
+              <a:sym typeface="Arial" panose="020B0604020202020204"/>
             </a:endParaRPr>
           </a:p>
         </p:txBody>
@@ -7457,20 +7377,14 @@
       </p:sp>
       <p:pic>
         <p:nvPicPr>
-          <p:cNvPr id="3" name="그림 2">
-            <a:extLst>
-              <a:ext uri="{FF2B5EF4-FFF2-40B4-BE49-F238E27FC236}">
-                <a16:creationId xmlns:a16="http://schemas.microsoft.com/office/drawing/2014/main" id="{0225C81B-EC6D-4029-9955-35A676A5B3E2}"/>
-              </a:ext>
-            </a:extLst>
-          </p:cNvPr>
+          <p:cNvPr id="3" name="그림 2"/>
           <p:cNvPicPr>
             <a:picLocks noChangeAspect="1"/>
           </p:cNvPicPr>
           <p:nvPr/>
         </p:nvPicPr>
         <p:blipFill>
-          <a:blip r:embed="rId3"/>
+          <a:blip r:embed="rId1"/>
           <a:stretch>
             <a:fillRect/>
           </a:stretch>
@@ -7487,16 +7401,8 @@
       </p:pic>
       <p:cxnSp>
         <p:nvCxnSpPr>
-          <p:cNvPr id="5" name="직선 화살표 연결선 4">
-            <a:extLst>
-              <a:ext uri="{FF2B5EF4-FFF2-40B4-BE49-F238E27FC236}">
-                <a16:creationId xmlns:a16="http://schemas.microsoft.com/office/drawing/2014/main" id="{09CE3142-6EBF-41BF-AADB-2C883F86C196}"/>
-              </a:ext>
-            </a:extLst>
-          </p:cNvPr>
-          <p:cNvCxnSpPr>
-            <a:cxnSpLocks/>
-          </p:cNvCxnSpPr>
+          <p:cNvPr id="5" name="직선 화살표 연결선 4"/>
+          <p:cNvCxnSpPr/>
           <p:nvPr/>
         </p:nvCxnSpPr>
         <p:spPr>
@@ -7528,13 +7434,7 @@
       </p:cxnSp>
       <p:sp>
         <p:nvSpPr>
-          <p:cNvPr id="6" name="TextBox 5">
-            <a:extLst>
-              <a:ext uri="{FF2B5EF4-FFF2-40B4-BE49-F238E27FC236}">
-                <a16:creationId xmlns:a16="http://schemas.microsoft.com/office/drawing/2014/main" id="{E435C35E-913E-47CC-8CAE-2051A8ECED43}"/>
-              </a:ext>
-            </a:extLst>
-          </p:cNvPr>
+          <p:cNvPr id="6" name="TextBox 5"/>
           <p:cNvSpPr txBox="1"/>
           <p:nvPr/>
         </p:nvSpPr>
@@ -7564,13 +7464,7 @@
       </p:sp>
       <p:sp>
         <p:nvSpPr>
-          <p:cNvPr id="41" name="TextBox 40">
-            <a:extLst>
-              <a:ext uri="{FF2B5EF4-FFF2-40B4-BE49-F238E27FC236}">
-                <a16:creationId xmlns:a16="http://schemas.microsoft.com/office/drawing/2014/main" id="{230C48CE-DF3B-4FA0-8AA7-E167C490847A}"/>
-              </a:ext>
-            </a:extLst>
-          </p:cNvPr>
+          <p:cNvPr id="41" name="TextBox 40"/>
           <p:cNvSpPr txBox="1"/>
           <p:nvPr/>
         </p:nvSpPr>
@@ -7600,16 +7494,8 @@
       </p:sp>
       <p:cxnSp>
         <p:nvCxnSpPr>
-          <p:cNvPr id="47" name="직선 화살표 연결선 46">
-            <a:extLst>
-              <a:ext uri="{FF2B5EF4-FFF2-40B4-BE49-F238E27FC236}">
-                <a16:creationId xmlns:a16="http://schemas.microsoft.com/office/drawing/2014/main" id="{F1A73AF1-0FBA-438D-8722-E179243A6CF5}"/>
-              </a:ext>
-            </a:extLst>
-          </p:cNvPr>
-          <p:cNvCxnSpPr>
-            <a:cxnSpLocks/>
-          </p:cNvCxnSpPr>
+          <p:cNvPr id="47" name="직선 화살표 연결선 46"/>
+          <p:cNvCxnSpPr/>
           <p:nvPr/>
         </p:nvCxnSpPr>
         <p:spPr>
@@ -7648,16 +7534,8 @@
       </p:cxnSp>
       <p:cxnSp>
         <p:nvCxnSpPr>
-          <p:cNvPr id="15" name="직선 화살표 연결선 14">
-            <a:extLst>
-              <a:ext uri="{FF2B5EF4-FFF2-40B4-BE49-F238E27FC236}">
-                <a16:creationId xmlns:a16="http://schemas.microsoft.com/office/drawing/2014/main" id="{09BBB3AE-1EAC-4E74-9B9A-EFD676C043C6}"/>
-              </a:ext>
-            </a:extLst>
-          </p:cNvPr>
-          <p:cNvCxnSpPr>
-            <a:cxnSpLocks/>
-          </p:cNvCxnSpPr>
+          <p:cNvPr id="15" name="직선 화살표 연결선 14"/>
+          <p:cNvCxnSpPr/>
           <p:nvPr/>
         </p:nvCxnSpPr>
         <p:spPr>
@@ -7689,13 +7567,7 @@
       </p:cxnSp>
       <p:sp>
         <p:nvSpPr>
-          <p:cNvPr id="54" name="직사각형 53">
-            <a:extLst>
-              <a:ext uri="{FF2B5EF4-FFF2-40B4-BE49-F238E27FC236}">
-                <a16:creationId xmlns:a16="http://schemas.microsoft.com/office/drawing/2014/main" id="{17FDAE0B-3D0B-4639-A81E-05D78C65BC94}"/>
-              </a:ext>
-            </a:extLst>
-          </p:cNvPr>
+          <p:cNvPr id="54" name="직사각형 53"/>
           <p:cNvSpPr/>
           <p:nvPr/>
         </p:nvSpPr>
@@ -7744,13 +7616,7 @@
       </p:sp>
       <p:sp>
         <p:nvSpPr>
-          <p:cNvPr id="17" name="직사각형 16">
-            <a:extLst>
-              <a:ext uri="{FF2B5EF4-FFF2-40B4-BE49-F238E27FC236}">
-                <a16:creationId xmlns:a16="http://schemas.microsoft.com/office/drawing/2014/main" id="{E19F562F-B926-4C17-B60E-96F6278DB240}"/>
-              </a:ext>
-            </a:extLst>
-          </p:cNvPr>
+          <p:cNvPr id="17" name="직사각형 16"/>
           <p:cNvSpPr/>
           <p:nvPr/>
         </p:nvSpPr>
@@ -7803,16 +7669,8 @@
       </p:sp>
       <p:cxnSp>
         <p:nvCxnSpPr>
-          <p:cNvPr id="56" name="직선 화살표 연결선 55">
-            <a:extLst>
-              <a:ext uri="{FF2B5EF4-FFF2-40B4-BE49-F238E27FC236}">
-                <a16:creationId xmlns:a16="http://schemas.microsoft.com/office/drawing/2014/main" id="{8FA8CAEC-7B60-4517-8DEA-D0B25136F17E}"/>
-              </a:ext>
-            </a:extLst>
-          </p:cNvPr>
-          <p:cNvCxnSpPr>
-            <a:cxnSpLocks/>
-          </p:cNvCxnSpPr>
+          <p:cNvPr id="56" name="직선 화살표 연결선 55"/>
+          <p:cNvCxnSpPr/>
           <p:nvPr/>
         </p:nvCxnSpPr>
         <p:spPr>
@@ -7844,13 +7702,7 @@
       </p:cxnSp>
       <p:sp>
         <p:nvSpPr>
-          <p:cNvPr id="18" name="타원 17">
-            <a:extLst>
-              <a:ext uri="{FF2B5EF4-FFF2-40B4-BE49-F238E27FC236}">
-                <a16:creationId xmlns:a16="http://schemas.microsoft.com/office/drawing/2014/main" id="{4AC5731E-FC10-4B63-9688-73238708A227}"/>
-              </a:ext>
-            </a:extLst>
-          </p:cNvPr>
+          <p:cNvPr id="18" name="타원 17"/>
           <p:cNvSpPr/>
           <p:nvPr/>
         </p:nvSpPr>
@@ -7903,16 +7755,8 @@
       </p:sp>
       <p:cxnSp>
         <p:nvCxnSpPr>
-          <p:cNvPr id="59" name="직선 화살표 연결선 58">
-            <a:extLst>
-              <a:ext uri="{FF2B5EF4-FFF2-40B4-BE49-F238E27FC236}">
-                <a16:creationId xmlns:a16="http://schemas.microsoft.com/office/drawing/2014/main" id="{0ACE1705-6046-4A45-A357-DE675042AF45}"/>
-              </a:ext>
-            </a:extLst>
-          </p:cNvPr>
-          <p:cNvCxnSpPr>
-            <a:cxnSpLocks/>
-          </p:cNvCxnSpPr>
+          <p:cNvPr id="59" name="직선 화살표 연결선 58"/>
+          <p:cNvCxnSpPr/>
           <p:nvPr/>
         </p:nvCxnSpPr>
         <p:spPr>
@@ -7944,13 +7788,7 @@
       </p:cxnSp>
       <p:sp>
         <p:nvSpPr>
-          <p:cNvPr id="65" name="직사각형 64">
-            <a:extLst>
-              <a:ext uri="{FF2B5EF4-FFF2-40B4-BE49-F238E27FC236}">
-                <a16:creationId xmlns:a16="http://schemas.microsoft.com/office/drawing/2014/main" id="{DAABDE61-5FA4-44BB-B4D1-04815AC08C09}"/>
-              </a:ext>
-            </a:extLst>
-          </p:cNvPr>
+          <p:cNvPr id="65" name="직사각형 64"/>
           <p:cNvSpPr/>
           <p:nvPr/>
         </p:nvSpPr>
@@ -8062,10 +7900,10 @@
               <a:solidFill>
                 <a:srgbClr val="FFFFFF"/>
               </a:solidFill>
-              <a:latin typeface="Arial"/>
-              <a:ea typeface="Arial"/>
-              <a:cs typeface="Arial"/>
-              <a:sym typeface="Arial"/>
+              <a:latin typeface="Arial" panose="020B0604020202020204"/>
+              <a:ea typeface="Arial" panose="020B0604020202020204"/>
+              <a:cs typeface="Arial" panose="020B0604020202020204"/>
+              <a:sym typeface="Arial" panose="020B0604020202020204"/>
             </a:endParaRPr>
           </a:p>
         </p:txBody>
@@ -8110,10 +7948,10 @@
               <a:solidFill>
                 <a:srgbClr val="FFFFFF"/>
               </a:solidFill>
-              <a:latin typeface="Arial"/>
-              <a:ea typeface="Arial"/>
-              <a:cs typeface="Arial"/>
-              <a:sym typeface="Arial"/>
+              <a:latin typeface="Arial" panose="020B0604020202020204"/>
+              <a:ea typeface="Arial" panose="020B0604020202020204"/>
+              <a:cs typeface="Arial" panose="020B0604020202020204"/>
+              <a:sym typeface="Arial" panose="020B0604020202020204"/>
             </a:endParaRPr>
           </a:p>
         </p:txBody>
@@ -8153,14 +7991,14 @@
               <a:buNone/>
             </a:pPr>
             <a:r>
-              <a:rPr lang="ko" sz="1500" dirty="0">
+              <a:rPr lang="en-US" sz="1500" dirty="0">
                 <a:solidFill>
                   <a:srgbClr val="3F3F3F"/>
                 </a:solidFill>
-                <a:latin typeface="Arial"/>
-                <a:ea typeface="Arial"/>
-                <a:cs typeface="Arial"/>
-                <a:sym typeface="Arial"/>
+                <a:latin typeface="Arial" panose="020B0604020202020204"/>
+                <a:ea typeface="Arial" panose="020B0604020202020204"/>
+                <a:cs typeface="Arial" panose="020B0604020202020204"/>
+                <a:sym typeface="Arial" panose="020B0604020202020204"/>
               </a:rPr>
               <a:t>PART 1</a:t>
             </a:r>
@@ -8168,10 +8006,10 @@
               <a:solidFill>
                 <a:srgbClr val="3F3F3F"/>
               </a:solidFill>
-              <a:latin typeface="Arial"/>
-              <a:ea typeface="Arial"/>
-              <a:cs typeface="Arial"/>
-              <a:sym typeface="Arial"/>
+              <a:latin typeface="Arial" panose="020B0604020202020204"/>
+              <a:ea typeface="Arial" panose="020B0604020202020204"/>
+              <a:cs typeface="Arial" panose="020B0604020202020204"/>
+              <a:sym typeface="Arial" panose="020B0604020202020204"/>
             </a:endParaRPr>
           </a:p>
         </p:txBody>
@@ -8216,10 +8054,10 @@
               <a:solidFill>
                 <a:srgbClr val="FFFFFF"/>
               </a:solidFill>
-              <a:latin typeface="Arial"/>
-              <a:ea typeface="Arial"/>
-              <a:cs typeface="Arial"/>
-              <a:sym typeface="Arial"/>
+              <a:latin typeface="Arial" panose="020B0604020202020204"/>
+              <a:ea typeface="Arial" panose="020B0604020202020204"/>
+              <a:cs typeface="Arial" panose="020B0604020202020204"/>
+              <a:sym typeface="Arial" panose="020B0604020202020204"/>
             </a:endParaRPr>
           </a:p>
         </p:txBody>
@@ -8276,13 +8114,7 @@
       </p:sp>
       <p:sp>
         <p:nvSpPr>
-          <p:cNvPr id="21" name="직사각형 20">
-            <a:extLst>
-              <a:ext uri="{FF2B5EF4-FFF2-40B4-BE49-F238E27FC236}">
-                <a16:creationId xmlns:a16="http://schemas.microsoft.com/office/drawing/2014/main" id="{E1EC8B1A-5B8F-4D62-9259-43AAF730E612}"/>
-              </a:ext>
-            </a:extLst>
-          </p:cNvPr>
+          <p:cNvPr id="21" name="직사각형 20"/>
           <p:cNvSpPr/>
           <p:nvPr/>
         </p:nvSpPr>
@@ -8341,13 +8173,7 @@
       </p:sp>
       <p:sp>
         <p:nvSpPr>
-          <p:cNvPr id="25" name="직사각형 24">
-            <a:extLst>
-              <a:ext uri="{FF2B5EF4-FFF2-40B4-BE49-F238E27FC236}">
-                <a16:creationId xmlns:a16="http://schemas.microsoft.com/office/drawing/2014/main" id="{B83BF7D8-BEFA-4559-AD3F-1CFBFFD75679}"/>
-              </a:ext>
-            </a:extLst>
-          </p:cNvPr>
+          <p:cNvPr id="25" name="직사각형 24"/>
           <p:cNvSpPr/>
           <p:nvPr/>
         </p:nvSpPr>
@@ -8406,13 +8232,7 @@
       </p:sp>
       <p:sp>
         <p:nvSpPr>
-          <p:cNvPr id="66" name="직사각형 65">
-            <a:extLst>
-              <a:ext uri="{FF2B5EF4-FFF2-40B4-BE49-F238E27FC236}">
-                <a16:creationId xmlns:a16="http://schemas.microsoft.com/office/drawing/2014/main" id="{6A990C24-40EA-4F7D-98E5-623BC64BD52B}"/>
-              </a:ext>
-            </a:extLst>
-          </p:cNvPr>
+          <p:cNvPr id="66" name="직사각형 65"/>
           <p:cNvSpPr/>
           <p:nvPr/>
         </p:nvSpPr>
@@ -8471,13 +8291,7 @@
       </p:sp>
       <p:sp>
         <p:nvSpPr>
-          <p:cNvPr id="75" name="직사각형 74">
-            <a:extLst>
-              <a:ext uri="{FF2B5EF4-FFF2-40B4-BE49-F238E27FC236}">
-                <a16:creationId xmlns:a16="http://schemas.microsoft.com/office/drawing/2014/main" id="{4504534A-4B5F-4FBC-8110-4C2323ECB16B}"/>
-              </a:ext>
-            </a:extLst>
-          </p:cNvPr>
+          <p:cNvPr id="75" name="직사각형 74"/>
           <p:cNvSpPr/>
           <p:nvPr/>
         </p:nvSpPr>
@@ -8526,13 +8340,7 @@
       </p:sp>
       <p:sp>
         <p:nvSpPr>
-          <p:cNvPr id="76" name="직사각형 75">
-            <a:extLst>
-              <a:ext uri="{FF2B5EF4-FFF2-40B4-BE49-F238E27FC236}">
-                <a16:creationId xmlns:a16="http://schemas.microsoft.com/office/drawing/2014/main" id="{E89004BC-9A4A-41E6-8CA2-3639C735C9BD}"/>
-              </a:ext>
-            </a:extLst>
-          </p:cNvPr>
+          <p:cNvPr id="76" name="직사각형 75"/>
           <p:cNvSpPr/>
           <p:nvPr/>
         </p:nvSpPr>
@@ -8581,13 +8389,7 @@
       </p:sp>
       <p:sp>
         <p:nvSpPr>
-          <p:cNvPr id="77" name="직사각형 76">
-            <a:extLst>
-              <a:ext uri="{FF2B5EF4-FFF2-40B4-BE49-F238E27FC236}">
-                <a16:creationId xmlns:a16="http://schemas.microsoft.com/office/drawing/2014/main" id="{E8CE86B6-C97F-488E-938A-9872779A3402}"/>
-              </a:ext>
-            </a:extLst>
-          </p:cNvPr>
+          <p:cNvPr id="77" name="직사각형 76"/>
           <p:cNvSpPr/>
           <p:nvPr/>
         </p:nvSpPr>
@@ -8636,13 +8438,7 @@
       </p:sp>
       <p:sp>
         <p:nvSpPr>
-          <p:cNvPr id="78" name="직사각형 77">
-            <a:extLst>
-              <a:ext uri="{FF2B5EF4-FFF2-40B4-BE49-F238E27FC236}">
-                <a16:creationId xmlns:a16="http://schemas.microsoft.com/office/drawing/2014/main" id="{45C53971-A357-485A-8E42-7B939E787C29}"/>
-              </a:ext>
-            </a:extLst>
-          </p:cNvPr>
+          <p:cNvPr id="78" name="직사각형 77"/>
           <p:cNvSpPr/>
           <p:nvPr/>
         </p:nvSpPr>
@@ -8691,13 +8487,7 @@
       </p:sp>
       <p:cxnSp>
         <p:nvCxnSpPr>
-          <p:cNvPr id="110" name="연결선: 꺾임 109">
-            <a:extLst>
-              <a:ext uri="{FF2B5EF4-FFF2-40B4-BE49-F238E27FC236}">
-                <a16:creationId xmlns:a16="http://schemas.microsoft.com/office/drawing/2014/main" id="{B5A513A6-0B86-4B88-B6FE-70D6BB3B654E}"/>
-              </a:ext>
-            </a:extLst>
-          </p:cNvPr>
+          <p:cNvPr id="110" name="연결선: 꺾임 109"/>
           <p:cNvCxnSpPr>
             <a:stCxn id="25" idx="2"/>
             <a:endCxn id="77" idx="0"/>
@@ -8733,13 +8523,7 @@
       </p:cxnSp>
       <p:cxnSp>
         <p:nvCxnSpPr>
-          <p:cNvPr id="112" name="연결선: 꺾임 111">
-            <a:extLst>
-              <a:ext uri="{FF2B5EF4-FFF2-40B4-BE49-F238E27FC236}">
-                <a16:creationId xmlns:a16="http://schemas.microsoft.com/office/drawing/2014/main" id="{D53C985C-C2DD-4D71-B06B-2D5C1AB4CC5A}"/>
-              </a:ext>
-            </a:extLst>
-          </p:cNvPr>
+          <p:cNvPr id="112" name="연결선: 꺾임 111"/>
           <p:cNvCxnSpPr>
             <a:stCxn id="66" idx="2"/>
             <a:endCxn id="75" idx="0"/>
@@ -8775,15 +8559,8 @@
       </p:cxnSp>
       <p:cxnSp>
         <p:nvCxnSpPr>
-          <p:cNvPr id="116" name="연결선: 꺾임 115">
-            <a:extLst>
-              <a:ext uri="{FF2B5EF4-FFF2-40B4-BE49-F238E27FC236}">
-                <a16:creationId xmlns:a16="http://schemas.microsoft.com/office/drawing/2014/main" id="{A54F33C0-068D-4366-BB39-C588CBEA16C3}"/>
-              </a:ext>
-            </a:extLst>
-          </p:cNvPr>
+          <p:cNvPr id="116" name="연결선: 꺾임 115"/>
           <p:cNvCxnSpPr>
-            <a:cxnSpLocks/>
             <a:endCxn id="76" idx="0"/>
           </p:cNvCxnSpPr>
           <p:nvPr/>
@@ -8817,15 +8594,8 @@
       </p:cxnSp>
       <p:cxnSp>
         <p:nvCxnSpPr>
-          <p:cNvPr id="118" name="연결선: 꺾임 117">
-            <a:extLst>
-              <a:ext uri="{FF2B5EF4-FFF2-40B4-BE49-F238E27FC236}">
-                <a16:creationId xmlns:a16="http://schemas.microsoft.com/office/drawing/2014/main" id="{6C7570A1-49A9-40DB-9592-CCD6FDEFC2B6}"/>
-              </a:ext>
-            </a:extLst>
-          </p:cNvPr>
+          <p:cNvPr id="118" name="연결선: 꺾임 117"/>
           <p:cNvCxnSpPr>
-            <a:cxnSpLocks/>
             <a:endCxn id="78" idx="0"/>
           </p:cNvCxnSpPr>
           <p:nvPr/>
@@ -8858,11 +8628,6 @@
         </p:style>
       </p:cxnSp>
     </p:spTree>
-    <p:extLst>
-      <p:ext uri="{BB962C8B-B14F-4D97-AF65-F5344CB8AC3E}">
-        <p14:creationId xmlns:p14="http://schemas.microsoft.com/office/powerpoint/2010/main" val="2019669650"/>
-      </p:ext>
-    </p:extLst>
   </p:cSld>
   <p:clrMapOvr>
     <a:masterClrMapping/>
@@ -8927,10 +8692,10 @@
               <a:solidFill>
                 <a:srgbClr val="FFFFFF"/>
               </a:solidFill>
-              <a:latin typeface="Arial"/>
-              <a:ea typeface="Arial"/>
-              <a:cs typeface="Arial"/>
-              <a:sym typeface="Arial"/>
+              <a:latin typeface="Arial" panose="020B0604020202020204"/>
+              <a:ea typeface="Arial" panose="020B0604020202020204"/>
+              <a:cs typeface="Arial" panose="020B0604020202020204"/>
+              <a:sym typeface="Arial" panose="020B0604020202020204"/>
             </a:endParaRPr>
           </a:p>
         </p:txBody>
@@ -8975,10 +8740,10 @@
               <a:solidFill>
                 <a:srgbClr val="FFFFFF"/>
               </a:solidFill>
-              <a:latin typeface="Arial"/>
-              <a:ea typeface="Arial"/>
-              <a:cs typeface="Arial"/>
-              <a:sym typeface="Arial"/>
+              <a:latin typeface="Arial" panose="020B0604020202020204"/>
+              <a:ea typeface="Arial" panose="020B0604020202020204"/>
+              <a:cs typeface="Arial" panose="020B0604020202020204"/>
+              <a:sym typeface="Arial" panose="020B0604020202020204"/>
             </a:endParaRPr>
           </a:p>
         </p:txBody>
@@ -9018,14 +8783,14 @@
               <a:buNone/>
             </a:pPr>
             <a:r>
-              <a:rPr lang="ko" sz="1500" dirty="0">
+              <a:rPr lang="en-US" sz="1500" dirty="0">
                 <a:solidFill>
                   <a:srgbClr val="3F3F3F"/>
                 </a:solidFill>
-                <a:latin typeface="Arial"/>
-                <a:ea typeface="Arial"/>
-                <a:cs typeface="Arial"/>
-                <a:sym typeface="Arial"/>
+                <a:latin typeface="Arial" panose="020B0604020202020204"/>
+                <a:ea typeface="Arial" panose="020B0604020202020204"/>
+                <a:cs typeface="Arial" panose="020B0604020202020204"/>
+                <a:sym typeface="Arial" panose="020B0604020202020204"/>
               </a:rPr>
               <a:t>PART 1</a:t>
             </a:r>
@@ -9033,10 +8798,10 @@
               <a:solidFill>
                 <a:srgbClr val="3F3F3F"/>
               </a:solidFill>
-              <a:latin typeface="Arial"/>
-              <a:ea typeface="Arial"/>
-              <a:cs typeface="Arial"/>
-              <a:sym typeface="Arial"/>
+              <a:latin typeface="Arial" panose="020B0604020202020204"/>
+              <a:ea typeface="Arial" panose="020B0604020202020204"/>
+              <a:cs typeface="Arial" panose="020B0604020202020204"/>
+              <a:sym typeface="Arial" panose="020B0604020202020204"/>
             </a:endParaRPr>
           </a:p>
         </p:txBody>
@@ -9081,10 +8846,10 @@
               <a:solidFill>
                 <a:srgbClr val="FFFFFF"/>
               </a:solidFill>
-              <a:latin typeface="Arial"/>
-              <a:ea typeface="Arial"/>
-              <a:cs typeface="Arial"/>
-              <a:sym typeface="Arial"/>
+              <a:latin typeface="Arial" panose="020B0604020202020204"/>
+              <a:ea typeface="Arial" panose="020B0604020202020204"/>
+              <a:cs typeface="Arial" panose="020B0604020202020204"/>
+              <a:sym typeface="Arial" panose="020B0604020202020204"/>
             </a:endParaRPr>
           </a:p>
         </p:txBody>
@@ -9141,13 +8906,7 @@
       </p:sp>
       <p:sp>
         <p:nvSpPr>
-          <p:cNvPr id="21" name="직사각형 20">
-            <a:extLst>
-              <a:ext uri="{FF2B5EF4-FFF2-40B4-BE49-F238E27FC236}">
-                <a16:creationId xmlns:a16="http://schemas.microsoft.com/office/drawing/2014/main" id="{E1EC8B1A-5B8F-4D62-9259-43AAF730E612}"/>
-              </a:ext>
-            </a:extLst>
-          </p:cNvPr>
+          <p:cNvPr id="21" name="직사각형 20"/>
           <p:cNvSpPr/>
           <p:nvPr/>
         </p:nvSpPr>
@@ -9206,13 +8965,7 @@
       </p:sp>
       <p:sp>
         <p:nvSpPr>
-          <p:cNvPr id="66" name="직사각형 65">
-            <a:extLst>
-              <a:ext uri="{FF2B5EF4-FFF2-40B4-BE49-F238E27FC236}">
-                <a16:creationId xmlns:a16="http://schemas.microsoft.com/office/drawing/2014/main" id="{6A990C24-40EA-4F7D-98E5-623BC64BD52B}"/>
-              </a:ext>
-            </a:extLst>
-          </p:cNvPr>
+          <p:cNvPr id="66" name="직사각형 65"/>
           <p:cNvSpPr/>
           <p:nvPr/>
         </p:nvSpPr>
@@ -9271,13 +9024,7 @@
       </p:sp>
       <p:sp>
         <p:nvSpPr>
-          <p:cNvPr id="75" name="직사각형 74">
-            <a:extLst>
-              <a:ext uri="{FF2B5EF4-FFF2-40B4-BE49-F238E27FC236}">
-                <a16:creationId xmlns:a16="http://schemas.microsoft.com/office/drawing/2014/main" id="{4504534A-4B5F-4FBC-8110-4C2323ECB16B}"/>
-              </a:ext>
-            </a:extLst>
-          </p:cNvPr>
+          <p:cNvPr id="75" name="직사각형 74"/>
           <p:cNvSpPr/>
           <p:nvPr/>
         </p:nvSpPr>
@@ -9326,13 +9073,7 @@
       </p:sp>
       <p:sp>
         <p:nvSpPr>
-          <p:cNvPr id="76" name="직사각형 75">
-            <a:extLst>
-              <a:ext uri="{FF2B5EF4-FFF2-40B4-BE49-F238E27FC236}">
-                <a16:creationId xmlns:a16="http://schemas.microsoft.com/office/drawing/2014/main" id="{E89004BC-9A4A-41E6-8CA2-3639C735C9BD}"/>
-              </a:ext>
-            </a:extLst>
-          </p:cNvPr>
+          <p:cNvPr id="76" name="직사각형 75"/>
           <p:cNvSpPr/>
           <p:nvPr/>
         </p:nvSpPr>
@@ -9381,13 +9122,7 @@
       </p:sp>
       <p:sp>
         <p:nvSpPr>
-          <p:cNvPr id="78" name="직사각형 77">
-            <a:extLst>
-              <a:ext uri="{FF2B5EF4-FFF2-40B4-BE49-F238E27FC236}">
-                <a16:creationId xmlns:a16="http://schemas.microsoft.com/office/drawing/2014/main" id="{45C53971-A357-485A-8E42-7B939E787C29}"/>
-              </a:ext>
-            </a:extLst>
-          </p:cNvPr>
+          <p:cNvPr id="78" name="직사각형 77"/>
           <p:cNvSpPr/>
           <p:nvPr/>
         </p:nvSpPr>
@@ -9436,15 +9171,8 @@
       </p:sp>
       <p:cxnSp>
         <p:nvCxnSpPr>
-          <p:cNvPr id="112" name="연결선: 꺾임 111">
-            <a:extLst>
-              <a:ext uri="{FF2B5EF4-FFF2-40B4-BE49-F238E27FC236}">
-                <a16:creationId xmlns:a16="http://schemas.microsoft.com/office/drawing/2014/main" id="{D53C985C-C2DD-4D71-B06B-2D5C1AB4CC5A}"/>
-              </a:ext>
-            </a:extLst>
-          </p:cNvPr>
+          <p:cNvPr id="112" name="연결선: 꺾임 111"/>
           <p:cNvCxnSpPr>
-            <a:cxnSpLocks/>
             <a:stCxn id="66" idx="2"/>
             <a:endCxn id="75" idx="0"/>
           </p:cNvCxnSpPr>
@@ -9479,15 +9207,8 @@
       </p:cxnSp>
       <p:cxnSp>
         <p:nvCxnSpPr>
-          <p:cNvPr id="116" name="연결선: 꺾임 115">
-            <a:extLst>
-              <a:ext uri="{FF2B5EF4-FFF2-40B4-BE49-F238E27FC236}">
-                <a16:creationId xmlns:a16="http://schemas.microsoft.com/office/drawing/2014/main" id="{A54F33C0-068D-4366-BB39-C588CBEA16C3}"/>
-              </a:ext>
-            </a:extLst>
-          </p:cNvPr>
+          <p:cNvPr id="116" name="연결선: 꺾임 115"/>
           <p:cNvCxnSpPr>
-            <a:cxnSpLocks/>
             <a:endCxn id="76" idx="0"/>
           </p:cNvCxnSpPr>
           <p:nvPr/>
@@ -9521,15 +9242,8 @@
       </p:cxnSp>
       <p:cxnSp>
         <p:nvCxnSpPr>
-          <p:cNvPr id="118" name="연결선: 꺾임 117">
-            <a:extLst>
-              <a:ext uri="{FF2B5EF4-FFF2-40B4-BE49-F238E27FC236}">
-                <a16:creationId xmlns:a16="http://schemas.microsoft.com/office/drawing/2014/main" id="{6C7570A1-49A9-40DB-9592-CCD6FDEFC2B6}"/>
-              </a:ext>
-            </a:extLst>
-          </p:cNvPr>
+          <p:cNvPr id="118" name="연결선: 꺾임 117"/>
           <p:cNvCxnSpPr>
-            <a:cxnSpLocks/>
             <a:endCxn id="78" idx="0"/>
           </p:cNvCxnSpPr>
           <p:nvPr/>
@@ -9562,11 +9276,6 @@
         </p:style>
       </p:cxnSp>
     </p:spTree>
-    <p:extLst>
-      <p:ext uri="{BB962C8B-B14F-4D97-AF65-F5344CB8AC3E}">
-        <p14:creationId xmlns:p14="http://schemas.microsoft.com/office/powerpoint/2010/main" val="182976075"/>
-      </p:ext>
-    </p:extLst>
   </p:cSld>
   <p:clrMapOvr>
     <a:masterClrMapping/>
@@ -9609,13 +9318,7 @@
       </p:grpSpPr>
       <p:sp>
         <p:nvSpPr>
-          <p:cNvPr id="9" name="Google Shape;172;p19">
-            <a:extLst>
-              <a:ext uri="{FF2B5EF4-FFF2-40B4-BE49-F238E27FC236}">
-                <a16:creationId xmlns:a16="http://schemas.microsoft.com/office/drawing/2014/main" id="{0D145AA4-400B-4D46-998C-2819903A3ECF}"/>
-              </a:ext>
-            </a:extLst>
-          </p:cNvPr>
+          <p:cNvPr id="9" name="Google Shape;172;p19"/>
           <p:cNvSpPr/>
           <p:nvPr/>
         </p:nvSpPr>
@@ -9657,23 +9360,17 @@
               <a:solidFill>
                 <a:srgbClr val="FFFFFF"/>
               </a:solidFill>
-              <a:latin typeface="Arial"/>
-              <a:ea typeface="Arial"/>
-              <a:cs typeface="Arial"/>
-              <a:sym typeface="Arial"/>
+              <a:latin typeface="Arial" panose="020B0604020202020204"/>
+              <a:ea typeface="Arial" panose="020B0604020202020204"/>
+              <a:cs typeface="Arial" panose="020B0604020202020204"/>
+              <a:sym typeface="Arial" panose="020B0604020202020204"/>
             </a:endParaRPr>
           </a:p>
         </p:txBody>
       </p:sp>
       <p:cxnSp>
         <p:nvCxnSpPr>
-          <p:cNvPr id="10" name="Google Shape;173;p19">
-            <a:extLst>
-              <a:ext uri="{FF2B5EF4-FFF2-40B4-BE49-F238E27FC236}">
-                <a16:creationId xmlns:a16="http://schemas.microsoft.com/office/drawing/2014/main" id="{59C3D9D7-FCEF-44EE-BDF1-0B4BCA3C53FE}"/>
-              </a:ext>
-            </a:extLst>
-          </p:cNvPr>
+          <p:cNvPr id="10" name="Google Shape;173;p19"/>
           <p:cNvCxnSpPr>
             <a:stCxn id="12" idx="2"/>
           </p:cNvCxnSpPr>
@@ -9701,13 +9398,7 @@
       </p:cxnSp>
       <p:grpSp>
         <p:nvGrpSpPr>
-          <p:cNvPr id="11" name="Google Shape;175;p19">
-            <a:extLst>
-              <a:ext uri="{FF2B5EF4-FFF2-40B4-BE49-F238E27FC236}">
-                <a16:creationId xmlns:a16="http://schemas.microsoft.com/office/drawing/2014/main" id="{E99B3397-EF9F-4A61-8BAD-33CFAF8DF53E}"/>
-              </a:ext>
-            </a:extLst>
-          </p:cNvPr>
+          <p:cNvPr id="11" name="Google Shape;175;p19"/>
           <p:cNvGrpSpPr/>
           <p:nvPr/>
         </p:nvGrpSpPr>
@@ -9721,13 +9412,7 @@
         </p:grpSpPr>
         <p:sp>
           <p:nvSpPr>
-            <p:cNvPr id="12" name="Google Shape;174;p19">
-              <a:extLst>
-                <a:ext uri="{FF2B5EF4-FFF2-40B4-BE49-F238E27FC236}">
-                  <a16:creationId xmlns:a16="http://schemas.microsoft.com/office/drawing/2014/main" id="{D91B6946-3E11-4CE3-A51C-74294C4C8DCE}"/>
-                </a:ext>
-              </a:extLst>
-            </p:cNvPr>
+            <p:cNvPr id="12" name="Google Shape;174;p19"/>
             <p:cNvSpPr txBox="1"/>
             <p:nvPr/>
           </p:nvSpPr>
@@ -9760,14 +9445,14 @@
                 <a:buNone/>
               </a:pPr>
               <a:r>
-                <a:rPr lang="en-US" altLang="ko" sz="5000" dirty="0">
+                <a:rPr lang="en-US" altLang="en-US" sz="5000" dirty="0">
                   <a:solidFill>
                     <a:schemeClr val="lt1"/>
                   </a:solidFill>
                 </a:rPr>
                 <a:t>02</a:t>
               </a:r>
-              <a:endParaRPr lang="ko" altLang="en-US" sz="5000" dirty="0">
+              <a:endParaRPr lang="en-US" altLang="en-US" sz="5000" dirty="0">
                 <a:solidFill>
                   <a:schemeClr val="lt1"/>
                 </a:solidFill>
@@ -9777,13 +9462,7 @@
         </p:sp>
         <p:sp>
           <p:nvSpPr>
-            <p:cNvPr id="13" name="Google Shape;177;p19">
-              <a:extLst>
-                <a:ext uri="{FF2B5EF4-FFF2-40B4-BE49-F238E27FC236}">
-                  <a16:creationId xmlns:a16="http://schemas.microsoft.com/office/drawing/2014/main" id="{BF0C798A-58FA-415B-ADE9-98995C30E26E}"/>
-                </a:ext>
-              </a:extLst>
-            </p:cNvPr>
+            <p:cNvPr id="13" name="Google Shape;177;p19"/>
             <p:cNvSpPr txBox="1"/>
             <p:nvPr/>
           </p:nvSpPr>
@@ -9820,10 +9499,10 @@
                   <a:solidFill>
                     <a:schemeClr val="lt1"/>
                   </a:solidFill>
-                  <a:latin typeface="Malgun Gothic"/>
-                  <a:ea typeface="Malgun Gothic"/>
-                  <a:cs typeface="Malgun Gothic"/>
-                  <a:sym typeface="Malgun Gothic"/>
+                  <a:latin typeface="맑은 고딕" panose="020B0503020000020004" charset="-127"/>
+                  <a:ea typeface="맑은 고딕" panose="020B0503020000020004" charset="-127"/>
+                  <a:cs typeface="맑은 고딕" panose="020B0503020000020004" charset="-127"/>
+                  <a:sym typeface="맑은 고딕" panose="020B0503020000020004" charset="-127"/>
                 </a:rPr>
                 <a:t> </a:t>
               </a:r>
@@ -9832,10 +9511,10 @@
                   <a:solidFill>
                     <a:schemeClr val="lt1"/>
                   </a:solidFill>
-                  <a:latin typeface="Malgun Gothic"/>
-                  <a:ea typeface="Malgun Gothic"/>
-                  <a:cs typeface="Malgun Gothic"/>
-                  <a:sym typeface="Malgun Gothic"/>
+                  <a:latin typeface="맑은 고딕" panose="020B0503020000020004" charset="-127"/>
+                  <a:ea typeface="맑은 고딕" panose="020B0503020000020004" charset="-127"/>
+                  <a:cs typeface="맑은 고딕" panose="020B0503020000020004" charset="-127"/>
+                  <a:sym typeface="맑은 고딕" panose="020B0503020000020004" charset="-127"/>
                 </a:rPr>
                 <a:t>DB </a:t>
               </a:r>
@@ -9844,10 +9523,10 @@
                   <a:solidFill>
                     <a:schemeClr val="lt1"/>
                   </a:solidFill>
-                  <a:latin typeface="Malgun Gothic"/>
-                  <a:ea typeface="Malgun Gothic"/>
-                  <a:cs typeface="Malgun Gothic"/>
-                  <a:sym typeface="Malgun Gothic"/>
+                  <a:latin typeface="맑은 고딕" panose="020B0503020000020004" charset="-127"/>
+                  <a:ea typeface="맑은 고딕" panose="020B0503020000020004" charset="-127"/>
+                  <a:cs typeface="맑은 고딕" panose="020B0503020000020004" charset="-127"/>
+                  <a:sym typeface="맑은 고딕" panose="020B0503020000020004" charset="-127"/>
                 </a:rPr>
                 <a:t>테이블 구조</a:t>
               </a:r>
@@ -9855,10 +9534,10 @@
                 <a:solidFill>
                   <a:schemeClr val="lt1"/>
                 </a:solidFill>
-                <a:latin typeface="Malgun Gothic"/>
-                <a:ea typeface="Malgun Gothic"/>
-                <a:cs typeface="Malgun Gothic"/>
-                <a:sym typeface="Malgun Gothic"/>
+                <a:latin typeface="맑은 고딕" panose="020B0503020000020004" charset="-127"/>
+                <a:ea typeface="맑은 고딕" panose="020B0503020000020004" charset="-127"/>
+                <a:cs typeface="맑은 고딕" panose="020B0503020000020004" charset="-127"/>
+                <a:sym typeface="맑은 고딕" panose="020B0503020000020004" charset="-127"/>
               </a:endParaRPr>
             </a:p>
           </p:txBody>
@@ -9929,10 +9608,10 @@
               <a:solidFill>
                 <a:srgbClr val="FFFFFF"/>
               </a:solidFill>
-              <a:latin typeface="Arial"/>
-              <a:ea typeface="Arial"/>
-              <a:cs typeface="Arial"/>
-              <a:sym typeface="Arial"/>
+              <a:latin typeface="Arial" panose="020B0604020202020204"/>
+              <a:ea typeface="Arial" panose="020B0604020202020204"/>
+              <a:cs typeface="Arial" panose="020B0604020202020204"/>
+              <a:sym typeface="Arial" panose="020B0604020202020204"/>
             </a:endParaRPr>
           </a:p>
         </p:txBody>
@@ -9977,10 +9656,10 @@
               <a:solidFill>
                 <a:srgbClr val="FFFFFF"/>
               </a:solidFill>
-              <a:latin typeface="Arial"/>
-              <a:ea typeface="Arial"/>
-              <a:cs typeface="Arial"/>
-              <a:sym typeface="Arial"/>
+              <a:latin typeface="Arial" panose="020B0604020202020204"/>
+              <a:ea typeface="Arial" panose="020B0604020202020204"/>
+              <a:cs typeface="Arial" panose="020B0604020202020204"/>
+              <a:sym typeface="Arial" panose="020B0604020202020204"/>
             </a:endParaRPr>
           </a:p>
         </p:txBody>
@@ -10020,26 +9699,26 @@
               <a:buNone/>
             </a:pPr>
             <a:r>
-              <a:rPr lang="ko" sz="1500" dirty="0">
+              <a:rPr lang="en-US" sz="1500" dirty="0">
                 <a:solidFill>
                   <a:srgbClr val="3F3F3F"/>
                 </a:solidFill>
-                <a:latin typeface="Arial"/>
-                <a:ea typeface="Arial"/>
-                <a:cs typeface="Arial"/>
-                <a:sym typeface="Arial"/>
+                <a:latin typeface="Arial" panose="020B0604020202020204"/>
+                <a:ea typeface="Arial" panose="020B0604020202020204"/>
+                <a:cs typeface="Arial" panose="020B0604020202020204"/>
+                <a:sym typeface="Arial" panose="020B0604020202020204"/>
               </a:rPr>
               <a:t>PART </a:t>
             </a:r>
             <a:r>
-              <a:rPr lang="en-US" altLang="ko" sz="1500" dirty="0">
+              <a:rPr lang="en-US" altLang="en-US" sz="1500" dirty="0">
                 <a:solidFill>
                   <a:srgbClr val="3F3F3F"/>
                 </a:solidFill>
-                <a:latin typeface="Arial"/>
-                <a:ea typeface="Arial"/>
-                <a:cs typeface="Arial"/>
-                <a:sym typeface="Arial"/>
+                <a:latin typeface="Arial" panose="020B0604020202020204"/>
+                <a:ea typeface="Arial" panose="020B0604020202020204"/>
+                <a:cs typeface="Arial" panose="020B0604020202020204"/>
+                <a:sym typeface="Arial" panose="020B0604020202020204"/>
               </a:rPr>
               <a:t>2</a:t>
             </a:r>
@@ -10047,10 +9726,10 @@
               <a:solidFill>
                 <a:srgbClr val="3F3F3F"/>
               </a:solidFill>
-              <a:latin typeface="Arial"/>
-              <a:ea typeface="Arial"/>
-              <a:cs typeface="Arial"/>
-              <a:sym typeface="Arial"/>
+              <a:latin typeface="Arial" panose="020B0604020202020204"/>
+              <a:ea typeface="Arial" panose="020B0604020202020204"/>
+              <a:cs typeface="Arial" panose="020B0604020202020204"/>
+              <a:sym typeface="Arial" panose="020B0604020202020204"/>
             </a:endParaRPr>
           </a:p>
         </p:txBody>
@@ -10095,10 +9774,10 @@
               <a:solidFill>
                 <a:srgbClr val="FFFFFF"/>
               </a:solidFill>
-              <a:latin typeface="Arial"/>
-              <a:ea typeface="Arial"/>
-              <a:cs typeface="Arial"/>
-              <a:sym typeface="Arial"/>
+              <a:latin typeface="Arial" panose="020B0604020202020204"/>
+              <a:ea typeface="Arial" panose="020B0604020202020204"/>
+              <a:cs typeface="Arial" panose="020B0604020202020204"/>
+              <a:sym typeface="Arial" panose="020B0604020202020204"/>
             </a:endParaRPr>
           </a:p>
         </p:txBody>
@@ -10153,32 +9832,25 @@
               </a:rPr>
               <a:t>테이블 구조</a:t>
             </a:r>
+            <a:endParaRPr lang="ko-KR" altLang="en-US" sz="2400" b="1" dirty="0">
+              <a:solidFill>
+                <a:srgbClr val="3F3F3F"/>
+              </a:solidFill>
+            </a:endParaRPr>
           </a:p>
         </p:txBody>
       </p:sp>
       <p:graphicFrame>
         <p:nvGraphicFramePr>
-          <p:cNvPr id="5" name="표 5">
-            <a:extLst>
-              <a:ext uri="{FF2B5EF4-FFF2-40B4-BE49-F238E27FC236}">
-                <a16:creationId xmlns:a16="http://schemas.microsoft.com/office/drawing/2014/main" id="{B627889C-D23F-4D58-A9E7-2EBB84C43533}"/>
-              </a:ext>
-            </a:extLst>
-          </p:cNvPr>
+          <p:cNvPr id="5" name="표 5"/>
           <p:cNvGraphicFramePr>
             <a:graphicFrameLocks noGrp="1"/>
           </p:cNvGraphicFramePr>
-          <p:nvPr>
-            <p:extLst>
-              <p:ext uri="{D42A27DB-BD31-4B8C-83A1-F6EECF244321}">
-                <p14:modId xmlns:p14="http://schemas.microsoft.com/office/powerpoint/2010/main" val="2965519941"/>
-              </p:ext>
-            </p:extLst>
-          </p:nvPr>
+          <p:nvPr/>
         </p:nvGraphicFramePr>
         <p:xfrm>
           <a:off x="242177" y="1777157"/>
-          <a:ext cx="3160935" cy="2194560"/>
+          <a:ext cx="3161030" cy="2468880"/>
         </p:xfrm>
         <a:graphic>
           <a:graphicData uri="http://schemas.openxmlformats.org/drawingml/2006/table">
@@ -10187,27 +9859,9 @@
                 <a:tableStyleId>{B86B6F93-9444-4D0E-96B6-58DB1BFE6F4C}</a:tableStyleId>
               </a:tblPr>
               <a:tblGrid>
-                <a:gridCol w="1039345">
-                  <a:extLst>
-                    <a:ext uri="{9D8B030D-6E8A-4147-A177-3AD203B41FA5}">
-                      <a16:colId xmlns:a16="http://schemas.microsoft.com/office/drawing/2014/main" val="475785030"/>
-                    </a:ext>
-                  </a:extLst>
-                </a:gridCol>
-                <a:gridCol w="970542">
-                  <a:extLst>
-                    <a:ext uri="{9D8B030D-6E8A-4147-A177-3AD203B41FA5}">
-                      <a16:colId xmlns:a16="http://schemas.microsoft.com/office/drawing/2014/main" val="1496488654"/>
-                    </a:ext>
-                  </a:extLst>
-                </a:gridCol>
-                <a:gridCol w="1151048">
-                  <a:extLst>
-                    <a:ext uri="{9D8B030D-6E8A-4147-A177-3AD203B41FA5}">
-                      <a16:colId xmlns:a16="http://schemas.microsoft.com/office/drawing/2014/main" val="571107939"/>
-                    </a:ext>
-                  </a:extLst>
-                </a:gridCol>
+                <a:gridCol w="1039345"/>
+                <a:gridCol w="970542"/>
+                <a:gridCol w="1151048"/>
               </a:tblGrid>
               <a:tr h="249570">
                 <a:tc>
@@ -10291,11 +9945,6 @@
                     </a:gradFill>
                   </a:tcPr>
                 </a:tc>
-                <a:extLst>
-                  <a:ext uri="{0D108BD9-81ED-4DB2-BD59-A6C34878D82A}">
-                    <a16:rowId xmlns:a16="http://schemas.microsoft.com/office/drawing/2014/main" val="4073784146"/>
-                  </a:ext>
-                </a:extLst>
               </a:tr>
               <a:tr h="249570">
                 <a:tc>
@@ -10362,6 +10011,7 @@
                         <a:rPr lang="ko-KR" altLang="en-US" sz="1200" dirty="0"/>
                         <a:t>게시글 번호</a:t>
                       </a:r>
+                      <a:endParaRPr lang="ko-KR" altLang="en-US" sz="1200" dirty="0"/>
                     </a:p>
                   </a:txBody>
                   <a:tcPr>
@@ -10378,11 +10028,6 @@
                     </a:gradFill>
                   </a:tcPr>
                 </a:tc>
-                <a:extLst>
-                  <a:ext uri="{0D108BD9-81ED-4DB2-BD59-A6C34878D82A}">
-                    <a16:rowId xmlns:a16="http://schemas.microsoft.com/office/drawing/2014/main" val="734451308"/>
-                  </a:ext>
-                </a:extLst>
               </a:tr>
               <a:tr h="249570">
                 <a:tc>
@@ -10449,6 +10094,7 @@
                         <a:rPr lang="ko-KR" altLang="en-US" sz="1200" dirty="0"/>
                         <a:t>사용자 아이디</a:t>
                       </a:r>
+                      <a:endParaRPr lang="ko-KR" altLang="en-US" sz="1200" dirty="0"/>
                     </a:p>
                   </a:txBody>
                   <a:tcPr>
@@ -10465,11 +10111,6 @@
                     </a:gradFill>
                   </a:tcPr>
                 </a:tc>
-                <a:extLst>
-                  <a:ext uri="{0D108BD9-81ED-4DB2-BD59-A6C34878D82A}">
-                    <a16:rowId xmlns:a16="http://schemas.microsoft.com/office/drawing/2014/main" val="2711202102"/>
-                  </a:ext>
-                </a:extLst>
               </a:tr>
               <a:tr h="249570">
                 <a:tc>
@@ -10518,9 +10159,8 @@
                           <a:srgbClr val="000000"/>
                         </a:buClr>
                         <a:buSzTx/>
-                        <a:buFont typeface="Arial"/>
+                        <a:buFont typeface="Arial" panose="020B0604020202020204"/>
                         <a:buNone/>
-                        <a:tabLst/>
                         <a:defRPr/>
                       </a:pPr>
                       <a:r>
@@ -10554,6 +10194,7 @@
                         <a:rPr lang="ko-KR" altLang="en-US" sz="1200" dirty="0"/>
                         <a:t>글 제목</a:t>
                       </a:r>
+                      <a:endParaRPr lang="ko-KR" altLang="en-US" sz="1200" dirty="0"/>
                     </a:p>
                   </a:txBody>
                   <a:tcPr>
@@ -10570,11 +10211,6 @@
                     </a:gradFill>
                   </a:tcPr>
                 </a:tc>
-                <a:extLst>
-                  <a:ext uri="{0D108BD9-81ED-4DB2-BD59-A6C34878D82A}">
-                    <a16:rowId xmlns:a16="http://schemas.microsoft.com/office/drawing/2014/main" val="4095333573"/>
-                  </a:ext>
-                </a:extLst>
               </a:tr>
               <a:tr h="249570">
                 <a:tc>
@@ -10623,9 +10259,8 @@
                           <a:srgbClr val="000000"/>
                         </a:buClr>
                         <a:buSzTx/>
-                        <a:buFont typeface="Arial"/>
+                        <a:buFont typeface="Arial" panose="020B0604020202020204"/>
                         <a:buNone/>
-                        <a:tabLst/>
                         <a:defRPr/>
                       </a:pPr>
                       <a:r>
@@ -10659,6 +10294,7 @@
                         <a:rPr lang="ko-KR" altLang="en-US" sz="1200" dirty="0"/>
                         <a:t>글 내용</a:t>
                       </a:r>
+                      <a:endParaRPr lang="ko-KR" altLang="en-US" sz="1200" dirty="0"/>
                     </a:p>
                   </a:txBody>
                   <a:tcPr>
@@ -10675,11 +10311,6 @@
                     </a:gradFill>
                   </a:tcPr>
                 </a:tc>
-                <a:extLst>
-                  <a:ext uri="{0D108BD9-81ED-4DB2-BD59-A6C34878D82A}">
-                    <a16:rowId xmlns:a16="http://schemas.microsoft.com/office/drawing/2014/main" val="1517630588"/>
-                  </a:ext>
-                </a:extLst>
               </a:tr>
               <a:tr h="249570">
                 <a:tc>
@@ -10728,9 +10359,8 @@
                           <a:srgbClr val="000000"/>
                         </a:buClr>
                         <a:buSzTx/>
-                        <a:buFont typeface="Arial"/>
+                        <a:buFont typeface="Arial" panose="020B0604020202020204"/>
                         <a:buNone/>
-                        <a:tabLst/>
                         <a:defRPr/>
                       </a:pPr>
                       <a:r>
@@ -10764,6 +10394,7 @@
                         <a:rPr lang="ko-KR" altLang="en-US" sz="1200" dirty="0"/>
                         <a:t>조회수</a:t>
                       </a:r>
+                      <a:endParaRPr lang="ko-KR" altLang="en-US" sz="1200" dirty="0"/>
                     </a:p>
                   </a:txBody>
                   <a:tcPr>
@@ -10780,11 +10411,6 @@
                     </a:gradFill>
                   </a:tcPr>
                 </a:tc>
-                <a:extLst>
-                  <a:ext uri="{0D108BD9-81ED-4DB2-BD59-A6C34878D82A}">
-                    <a16:rowId xmlns:a16="http://schemas.microsoft.com/office/drawing/2014/main" val="2626420106"/>
-                  </a:ext>
-                </a:extLst>
               </a:tr>
               <a:tr h="249570">
                 <a:tc>
@@ -10833,9 +10459,8 @@
                           <a:srgbClr val="000000"/>
                         </a:buClr>
                         <a:buSzTx/>
-                        <a:buFont typeface="Arial"/>
+                        <a:buFont typeface="Arial" panose="020B0604020202020204"/>
                         <a:buNone/>
-                        <a:tabLst/>
                         <a:defRPr/>
                       </a:pPr>
                       <a:r>
@@ -10886,11 +10511,6 @@
                     </a:gradFill>
                   </a:tcPr>
                 </a:tc>
-                <a:extLst>
-                  <a:ext uri="{0D108BD9-81ED-4DB2-BD59-A6C34878D82A}">
-                    <a16:rowId xmlns:a16="http://schemas.microsoft.com/office/drawing/2014/main" val="4085947448"/>
-                  </a:ext>
-                </a:extLst>
               </a:tr>
               <a:tr h="249570">
                 <a:tc>
@@ -10957,6 +10577,7 @@
                         <a:rPr lang="ko-KR" altLang="en-US" sz="1200" dirty="0"/>
                         <a:t>작성날짜</a:t>
                       </a:r>
+                      <a:endParaRPr lang="ko-KR" altLang="en-US" sz="1200" dirty="0"/>
                     </a:p>
                   </a:txBody>
                   <a:tcPr>
@@ -10973,11 +10594,98 @@
                     </a:gradFill>
                   </a:tcPr>
                 </a:tc>
-                <a:extLst>
-                  <a:ext uri="{0D108BD9-81ED-4DB2-BD59-A6C34878D82A}">
-                    <a16:rowId xmlns:a16="http://schemas.microsoft.com/office/drawing/2014/main" val="557214970"/>
-                  </a:ext>
-                </a:extLst>
+              </a:tr>
+              <a:tr h="249570">
+                <a:tc>
+                  <a:txBody>
+                    <a:bodyPr/>
+                    <a:p>
+                      <a:pPr algn="ctr" latinLnBrk="1"/>
+                      <a:r>
+                        <a:rPr lang="en-US" altLang="ko-KR" sz="1200" dirty="0" err="1"/>
+                        <a:t>fileurl</a:t>
+                      </a:r>
+                      <a:endParaRPr lang="ko-KR" altLang="en-US" sz="1200" dirty="0"/>
+                    </a:p>
+                  </a:txBody>
+                  <a:tcPr>
+                    <a:gradFill>
+                      <a:gsLst>
+                        <a:gs pos="100000">
+                          <a:srgbClr val="DFFFFF"/>
+                        </a:gs>
+                        <a:gs pos="100000">
+                          <a:srgbClr val="0773E4"/>
+                        </a:gs>
+                      </a:gsLst>
+                      <a:lin ang="2880144" scaled="0"/>
+                    </a:gradFill>
+                  </a:tcPr>
+                </a:tc>
+                <a:tc>
+                  <a:txBody>
+                    <a:bodyPr/>
+                    <a:p>
+                      <a:pPr algn="ctr" latinLnBrk="1"/>
+                      <a:r>
+                        <a:rPr lang="en-US" altLang="ko-KR" sz="1200" dirty="0"/>
+                        <a:t>String</a:t>
+                      </a:r>
+                      <a:endParaRPr lang="ko-KR" altLang="en-US" sz="1200" dirty="0"/>
+                    </a:p>
+                  </a:txBody>
+                  <a:tcPr>
+                    <a:gradFill>
+                      <a:gsLst>
+                        <a:gs pos="100000">
+                          <a:srgbClr val="DFFFFF"/>
+                        </a:gs>
+                        <a:gs pos="100000">
+                          <a:srgbClr val="0773E4"/>
+                        </a:gs>
+                      </a:gsLst>
+                      <a:lin ang="2880144" scaled="0"/>
+                    </a:gradFill>
+                  </a:tcPr>
+                </a:tc>
+                <a:tc>
+                  <a:txBody>
+                    <a:bodyPr/>
+                    <a:p>
+                      <a:pPr algn="ctr" latinLnBrk="1"/>
+                      <a:r>
+                        <a:rPr lang="ko-KR" altLang="en-US" sz="1200" dirty="0"/>
+                        <a:t>파일</a:t>
+                      </a:r>
+                      <a:r>
+                        <a:rPr lang="en-US" altLang="ko-KR" sz="1200" dirty="0"/>
+                        <a:t> </a:t>
+                      </a:r>
+                      <a:r>
+                        <a:rPr lang="ko-KR" altLang="en-US" sz="1200" dirty="0"/>
+                        <a:t>저장</a:t>
+                      </a:r>
+                      <a:r>
+                        <a:rPr lang="ko-KR" altLang="en-US" sz="1200" dirty="0"/>
+                        <a:t>경로</a:t>
+                      </a:r>
+                      <a:endParaRPr lang="ko-KR" altLang="en-US" sz="1200" dirty="0"/>
+                    </a:p>
+                  </a:txBody>
+                  <a:tcPr>
+                    <a:gradFill>
+                      <a:gsLst>
+                        <a:gs pos="100000">
+                          <a:srgbClr val="DFFFFF"/>
+                        </a:gs>
+                        <a:gs pos="100000">
+                          <a:srgbClr val="0773E4"/>
+                        </a:gs>
+                      </a:gsLst>
+                      <a:lin ang="2880144" scaled="0"/>
+                    </a:gradFill>
+                  </a:tcPr>
+                </a:tc>
               </a:tr>
             </a:tbl>
           </a:graphicData>
@@ -10985,23 +10693,11 @@
       </p:graphicFrame>
       <p:graphicFrame>
         <p:nvGraphicFramePr>
-          <p:cNvPr id="26" name="표 5">
-            <a:extLst>
-              <a:ext uri="{FF2B5EF4-FFF2-40B4-BE49-F238E27FC236}">
-                <a16:creationId xmlns:a16="http://schemas.microsoft.com/office/drawing/2014/main" id="{8625D1F7-A103-46B8-B2AC-6C3F811C4D75}"/>
-              </a:ext>
-            </a:extLst>
-          </p:cNvPr>
+          <p:cNvPr id="26" name="표 5"/>
           <p:cNvGraphicFramePr>
             <a:graphicFrameLocks noGrp="1"/>
           </p:cNvGraphicFramePr>
-          <p:nvPr>
-            <p:extLst>
-              <p:ext uri="{D42A27DB-BD31-4B8C-83A1-F6EECF244321}">
-                <p14:modId xmlns:p14="http://schemas.microsoft.com/office/powerpoint/2010/main" val="3142738153"/>
-              </p:ext>
-            </p:extLst>
-          </p:nvPr>
+          <p:nvPr/>
         </p:nvGraphicFramePr>
         <p:xfrm>
           <a:off x="5215180" y="1013577"/>
@@ -11014,27 +10710,9 @@
                 <a:tableStyleId>{B86B6F93-9444-4D0E-96B6-58DB1BFE6F4C}</a:tableStyleId>
               </a:tblPr>
               <a:tblGrid>
-                <a:gridCol w="1140336">
-                  <a:extLst>
-                    <a:ext uri="{9D8B030D-6E8A-4147-A177-3AD203B41FA5}">
-                      <a16:colId xmlns:a16="http://schemas.microsoft.com/office/drawing/2014/main" val="475785030"/>
-                    </a:ext>
-                  </a:extLst>
-                </a:gridCol>
-                <a:gridCol w="1209362">
-                  <a:extLst>
-                    <a:ext uri="{9D8B030D-6E8A-4147-A177-3AD203B41FA5}">
-                      <a16:colId xmlns:a16="http://schemas.microsoft.com/office/drawing/2014/main" val="1496488654"/>
-                    </a:ext>
-                  </a:extLst>
-                </a:gridCol>
-                <a:gridCol w="1307902">
-                  <a:extLst>
-                    <a:ext uri="{9D8B030D-6E8A-4147-A177-3AD203B41FA5}">
-                      <a16:colId xmlns:a16="http://schemas.microsoft.com/office/drawing/2014/main" val="571107939"/>
-                    </a:ext>
-                  </a:extLst>
-                </a:gridCol>
+                <a:gridCol w="1140336"/>
+                <a:gridCol w="1209362"/>
+                <a:gridCol w="1307902"/>
               </a:tblGrid>
               <a:tr h="228300">
                 <a:tc>
@@ -11118,11 +10796,6 @@
                     </a:gradFill>
                   </a:tcPr>
                 </a:tc>
-                <a:extLst>
-                  <a:ext uri="{0D108BD9-81ED-4DB2-BD59-A6C34878D82A}">
-                    <a16:rowId xmlns:a16="http://schemas.microsoft.com/office/drawing/2014/main" val="4073784146"/>
-                  </a:ext>
-                </a:extLst>
               </a:tr>
               <a:tr h="228300">
                 <a:tc>
@@ -11189,6 +10862,7 @@
                         <a:rPr lang="ko-KR" altLang="en-US" sz="1200" dirty="0"/>
                         <a:t>사용자 아이디</a:t>
                       </a:r>
+                      <a:endParaRPr lang="ko-KR" altLang="en-US" sz="1200" dirty="0"/>
                     </a:p>
                   </a:txBody>
                   <a:tcPr>
@@ -11205,11 +10879,6 @@
                     </a:gradFill>
                   </a:tcPr>
                 </a:tc>
-                <a:extLst>
-                  <a:ext uri="{0D108BD9-81ED-4DB2-BD59-A6C34878D82A}">
-                    <a16:rowId xmlns:a16="http://schemas.microsoft.com/office/drawing/2014/main" val="734451308"/>
-                  </a:ext>
-                </a:extLst>
               </a:tr>
               <a:tr h="228300">
                 <a:tc>
@@ -11276,6 +10945,7 @@
                         <a:rPr lang="ko-KR" altLang="en-US" sz="1200" dirty="0"/>
                         <a:t>이름</a:t>
                       </a:r>
+                      <a:endParaRPr lang="ko-KR" altLang="en-US" sz="1200" dirty="0"/>
                     </a:p>
                   </a:txBody>
                   <a:tcPr>
@@ -11292,11 +10962,6 @@
                     </a:gradFill>
                   </a:tcPr>
                 </a:tc>
-                <a:extLst>
-                  <a:ext uri="{0D108BD9-81ED-4DB2-BD59-A6C34878D82A}">
-                    <a16:rowId xmlns:a16="http://schemas.microsoft.com/office/drawing/2014/main" val="2711202102"/>
-                  </a:ext>
-                </a:extLst>
               </a:tr>
               <a:tr h="228300">
                 <a:tc>
@@ -11345,9 +11010,8 @@
                           <a:srgbClr val="000000"/>
                         </a:buClr>
                         <a:buSzTx/>
-                        <a:buFont typeface="Arial"/>
+                        <a:buFont typeface="Arial" panose="020B0604020202020204"/>
                         <a:buNone/>
-                        <a:tabLst/>
                         <a:defRPr/>
                       </a:pPr>
                       <a:r>
@@ -11381,6 +11045,7 @@
                         <a:rPr lang="ko-KR" altLang="en-US" sz="1200" dirty="0"/>
                         <a:t>비밀번호</a:t>
                       </a:r>
+                      <a:endParaRPr lang="ko-KR" altLang="en-US" sz="1200" dirty="0"/>
                     </a:p>
                   </a:txBody>
                   <a:tcPr>
@@ -11397,11 +11062,6 @@
                     </a:gradFill>
                   </a:tcPr>
                 </a:tc>
-                <a:extLst>
-                  <a:ext uri="{0D108BD9-81ED-4DB2-BD59-A6C34878D82A}">
-                    <a16:rowId xmlns:a16="http://schemas.microsoft.com/office/drawing/2014/main" val="4095333573"/>
-                  </a:ext>
-                </a:extLst>
               </a:tr>
               <a:tr h="0">
                 <a:tc>
@@ -11450,9 +11110,8 @@
                           <a:srgbClr val="000000"/>
                         </a:buClr>
                         <a:buSzTx/>
-                        <a:buFont typeface="Arial"/>
+                        <a:buFont typeface="Arial" panose="020B0604020202020204"/>
                         <a:buNone/>
-                        <a:tabLst/>
                         <a:defRPr/>
                       </a:pPr>
                       <a:r>
@@ -11486,6 +11145,7 @@
                         <a:rPr lang="ko-KR" altLang="en-US" sz="1200" dirty="0"/>
                         <a:t>핸드폰번호</a:t>
                       </a:r>
+                      <a:endParaRPr lang="ko-KR" altLang="en-US" sz="1200" dirty="0"/>
                     </a:p>
                   </a:txBody>
                   <a:tcPr>
@@ -11502,11 +11162,6 @@
                     </a:gradFill>
                   </a:tcPr>
                 </a:tc>
-                <a:extLst>
-                  <a:ext uri="{0D108BD9-81ED-4DB2-BD59-A6C34878D82A}">
-                    <a16:rowId xmlns:a16="http://schemas.microsoft.com/office/drawing/2014/main" val="1517630588"/>
-                  </a:ext>
-                </a:extLst>
               </a:tr>
               <a:tr h="228300">
                 <a:tc>
@@ -11555,9 +11210,8 @@
                           <a:srgbClr val="000000"/>
                         </a:buClr>
                         <a:buSzTx/>
-                        <a:buFont typeface="Arial"/>
+                        <a:buFont typeface="Arial" panose="020B0604020202020204"/>
                         <a:buNone/>
-                        <a:tabLst/>
                         <a:defRPr/>
                       </a:pPr>
                       <a:r>
@@ -11591,6 +11245,7 @@
                         <a:rPr lang="ko-KR" altLang="en-US" sz="1200" dirty="0"/>
                         <a:t>이메일</a:t>
                       </a:r>
+                      <a:endParaRPr lang="ko-KR" altLang="en-US" sz="1200" dirty="0"/>
                     </a:p>
                   </a:txBody>
                   <a:tcPr>
@@ -11607,11 +11262,6 @@
                     </a:gradFill>
                   </a:tcPr>
                 </a:tc>
-                <a:extLst>
-                  <a:ext uri="{0D108BD9-81ED-4DB2-BD59-A6C34878D82A}">
-                    <a16:rowId xmlns:a16="http://schemas.microsoft.com/office/drawing/2014/main" val="2626420106"/>
-                  </a:ext>
-                </a:extLst>
               </a:tr>
             </a:tbl>
           </a:graphicData>
@@ -11619,23 +11269,11 @@
       </p:graphicFrame>
       <p:graphicFrame>
         <p:nvGraphicFramePr>
-          <p:cNvPr id="27" name="표 5">
-            <a:extLst>
-              <a:ext uri="{FF2B5EF4-FFF2-40B4-BE49-F238E27FC236}">
-                <a16:creationId xmlns:a16="http://schemas.microsoft.com/office/drawing/2014/main" id="{9251A46C-2002-4655-B2ED-B288E6D27561}"/>
-              </a:ext>
-            </a:extLst>
-          </p:cNvPr>
+          <p:cNvPr id="27" name="표 5"/>
           <p:cNvGraphicFramePr>
             <a:graphicFrameLocks noGrp="1"/>
           </p:cNvGraphicFramePr>
-          <p:nvPr>
-            <p:extLst>
-              <p:ext uri="{D42A27DB-BD31-4B8C-83A1-F6EECF244321}">
-                <p14:modId xmlns:p14="http://schemas.microsoft.com/office/powerpoint/2010/main" val="1433800829"/>
-              </p:ext>
-            </p:extLst>
-          </p:nvPr>
+          <p:nvPr/>
         </p:nvGraphicFramePr>
         <p:xfrm>
           <a:off x="5215180" y="3190851"/>
@@ -11648,27 +11286,9 @@
                 <a:tableStyleId>{B86B6F93-9444-4D0E-96B6-58DB1BFE6F4C}</a:tableStyleId>
               </a:tblPr>
               <a:tblGrid>
-                <a:gridCol w="1173345">
-                  <a:extLst>
-                    <a:ext uri="{9D8B030D-6E8A-4147-A177-3AD203B41FA5}">
-                      <a16:colId xmlns:a16="http://schemas.microsoft.com/office/drawing/2014/main" val="475785030"/>
-                    </a:ext>
-                  </a:extLst>
-                </a:gridCol>
-                <a:gridCol w="1149069">
-                  <a:extLst>
-                    <a:ext uri="{9D8B030D-6E8A-4147-A177-3AD203B41FA5}">
-                      <a16:colId xmlns:a16="http://schemas.microsoft.com/office/drawing/2014/main" val="1496488654"/>
-                    </a:ext>
-                  </a:extLst>
-                </a:gridCol>
-                <a:gridCol w="1335186">
-                  <a:extLst>
-                    <a:ext uri="{9D8B030D-6E8A-4147-A177-3AD203B41FA5}">
-                      <a16:colId xmlns:a16="http://schemas.microsoft.com/office/drawing/2014/main" val="571107939"/>
-                    </a:ext>
-                  </a:extLst>
-                </a:gridCol>
+                <a:gridCol w="1173345"/>
+                <a:gridCol w="1149069"/>
+                <a:gridCol w="1335186"/>
               </a:tblGrid>
               <a:tr h="228300">
                 <a:tc>
@@ -11752,11 +11372,6 @@
                     </a:gradFill>
                   </a:tcPr>
                 </a:tc>
-                <a:extLst>
-                  <a:ext uri="{0D108BD9-81ED-4DB2-BD59-A6C34878D82A}">
-                    <a16:rowId xmlns:a16="http://schemas.microsoft.com/office/drawing/2014/main" val="4073784146"/>
-                  </a:ext>
-                </a:extLst>
               </a:tr>
               <a:tr h="228300">
                 <a:tc>
@@ -11827,6 +11442,7 @@
                         <a:rPr lang="ko-KR" altLang="en-US" sz="1200" dirty="0"/>
                         <a:t> 번호</a:t>
                       </a:r>
+                      <a:endParaRPr lang="ko-KR" altLang="en-US" sz="1200" dirty="0"/>
                     </a:p>
                   </a:txBody>
                   <a:tcPr>
@@ -11843,11 +11459,6 @@
                     </a:gradFill>
                   </a:tcPr>
                 </a:tc>
-                <a:extLst>
-                  <a:ext uri="{0D108BD9-81ED-4DB2-BD59-A6C34878D82A}">
-                    <a16:rowId xmlns:a16="http://schemas.microsoft.com/office/drawing/2014/main" val="734451308"/>
-                  </a:ext>
-                </a:extLst>
               </a:tr>
               <a:tr h="228300">
                 <a:tc>
@@ -11869,9 +11480,8 @@
                           <a:srgbClr val="000000"/>
                         </a:buClr>
                         <a:buSzTx/>
-                        <a:buFont typeface="Arial"/>
+                        <a:buFont typeface="Arial" panose="020B0604020202020204"/>
                         <a:buNone/>
-                        <a:tabLst/>
                         <a:defRPr/>
                       </a:pPr>
                       <a:r>
@@ -11932,6 +11542,7 @@
                         <a:rPr lang="ko-KR" altLang="en-US" sz="1200" dirty="0"/>
                         <a:t>게시글 번호</a:t>
                       </a:r>
+                      <a:endParaRPr lang="ko-KR" altLang="en-US" sz="1200" dirty="0"/>
                     </a:p>
                   </a:txBody>
                   <a:tcPr>
@@ -11948,11 +11559,6 @@
                     </a:gradFill>
                   </a:tcPr>
                 </a:tc>
-                <a:extLst>
-                  <a:ext uri="{0D108BD9-81ED-4DB2-BD59-A6C34878D82A}">
-                    <a16:rowId xmlns:a16="http://schemas.microsoft.com/office/drawing/2014/main" val="2711202102"/>
-                  </a:ext>
-                </a:extLst>
               </a:tr>
               <a:tr h="228300">
                 <a:tc>
@@ -12001,9 +11607,8 @@
                           <a:srgbClr val="000000"/>
                         </a:buClr>
                         <a:buSzTx/>
-                        <a:buFont typeface="Arial"/>
+                        <a:buFont typeface="Arial" panose="020B0604020202020204"/>
                         <a:buNone/>
-                        <a:tabLst/>
                         <a:defRPr/>
                       </a:pPr>
                       <a:r>
@@ -12037,6 +11642,7 @@
                         <a:rPr lang="ko-KR" altLang="en-US" sz="1200" dirty="0"/>
                         <a:t>작성자 아이디</a:t>
                       </a:r>
+                      <a:endParaRPr lang="ko-KR" altLang="en-US" sz="1200" dirty="0"/>
                     </a:p>
                   </a:txBody>
                   <a:tcPr>
@@ -12053,11 +11659,6 @@
                     </a:gradFill>
                   </a:tcPr>
                 </a:tc>
-                <a:extLst>
-                  <a:ext uri="{0D108BD9-81ED-4DB2-BD59-A6C34878D82A}">
-                    <a16:rowId xmlns:a16="http://schemas.microsoft.com/office/drawing/2014/main" val="4095333573"/>
-                  </a:ext>
-                </a:extLst>
               </a:tr>
               <a:tr h="0">
                 <a:tc>
@@ -12106,9 +11707,8 @@
                           <a:srgbClr val="000000"/>
                         </a:buClr>
                         <a:buSzTx/>
-                        <a:buFont typeface="Arial"/>
+                        <a:buFont typeface="Arial" panose="020B0604020202020204"/>
                         <a:buNone/>
-                        <a:tabLst/>
                         <a:defRPr/>
                       </a:pPr>
                       <a:r>
@@ -12142,6 +11742,7 @@
                         <a:rPr lang="ko-KR" altLang="en-US" sz="1200" dirty="0"/>
                         <a:t>답변 내용</a:t>
                       </a:r>
+                      <a:endParaRPr lang="ko-KR" altLang="en-US" sz="1200" dirty="0"/>
                     </a:p>
                   </a:txBody>
                   <a:tcPr>
@@ -12158,11 +11759,6 @@
                     </a:gradFill>
                   </a:tcPr>
                 </a:tc>
-                <a:extLst>
-                  <a:ext uri="{0D108BD9-81ED-4DB2-BD59-A6C34878D82A}">
-                    <a16:rowId xmlns:a16="http://schemas.microsoft.com/office/drawing/2014/main" val="1517630588"/>
-                  </a:ext>
-                </a:extLst>
               </a:tr>
               <a:tr h="146598">
                 <a:tc>
@@ -12211,9 +11807,8 @@
                           <a:srgbClr val="000000"/>
                         </a:buClr>
                         <a:buSzTx/>
-                        <a:buFont typeface="Arial"/>
+                        <a:buFont typeface="Arial" panose="020B0604020202020204"/>
                         <a:buNone/>
-                        <a:tabLst/>
                         <a:defRPr/>
                       </a:pPr>
                       <a:r>
@@ -12247,6 +11842,7 @@
                         <a:rPr lang="ko-KR" altLang="en-US" sz="1200" dirty="0"/>
                         <a:t>답변날짜</a:t>
                       </a:r>
+                      <a:endParaRPr lang="ko-KR" altLang="en-US" sz="1200" dirty="0"/>
                     </a:p>
                   </a:txBody>
                   <a:tcPr>
@@ -12263,11 +11859,6 @@
                     </a:gradFill>
                   </a:tcPr>
                 </a:tc>
-                <a:extLst>
-                  <a:ext uri="{0D108BD9-81ED-4DB2-BD59-A6C34878D82A}">
-                    <a16:rowId xmlns:a16="http://schemas.microsoft.com/office/drawing/2014/main" val="2626420106"/>
-                  </a:ext>
-                </a:extLst>
               </a:tr>
             </a:tbl>
           </a:graphicData>
@@ -12275,13 +11866,7 @@
       </p:graphicFrame>
       <p:sp>
         <p:nvSpPr>
-          <p:cNvPr id="28" name="Google Shape;225;p23">
-            <a:extLst>
-              <a:ext uri="{FF2B5EF4-FFF2-40B4-BE49-F238E27FC236}">
-                <a16:creationId xmlns:a16="http://schemas.microsoft.com/office/drawing/2014/main" id="{F22F3AB7-3C43-49DC-B0F1-6BE013654B10}"/>
-              </a:ext>
-            </a:extLst>
-          </p:cNvPr>
+          <p:cNvPr id="28" name="Google Shape;225;p23"/>
           <p:cNvSpPr txBox="1"/>
           <p:nvPr/>
         </p:nvSpPr>
@@ -12339,13 +11924,7 @@
       </p:sp>
       <p:sp>
         <p:nvSpPr>
-          <p:cNvPr id="29" name="Google Shape;225;p23">
-            <a:extLst>
-              <a:ext uri="{FF2B5EF4-FFF2-40B4-BE49-F238E27FC236}">
-                <a16:creationId xmlns:a16="http://schemas.microsoft.com/office/drawing/2014/main" id="{791122F8-766A-428C-A753-E778252DF660}"/>
-              </a:ext>
-            </a:extLst>
-          </p:cNvPr>
+          <p:cNvPr id="29" name="Google Shape;225;p23"/>
           <p:cNvSpPr txBox="1"/>
           <p:nvPr/>
         </p:nvSpPr>
@@ -12403,13 +11982,7 @@
       </p:sp>
       <p:sp>
         <p:nvSpPr>
-          <p:cNvPr id="30" name="Google Shape;225;p23">
-            <a:extLst>
-              <a:ext uri="{FF2B5EF4-FFF2-40B4-BE49-F238E27FC236}">
-                <a16:creationId xmlns:a16="http://schemas.microsoft.com/office/drawing/2014/main" id="{567A6A92-3132-4DEC-BD95-D428514A8C37}"/>
-              </a:ext>
-            </a:extLst>
-          </p:cNvPr>
+          <p:cNvPr id="30" name="Google Shape;225;p23"/>
           <p:cNvSpPr txBox="1"/>
           <p:nvPr/>
         </p:nvSpPr>
@@ -12467,16 +12040,8 @@
       </p:sp>
       <p:cxnSp>
         <p:nvCxnSpPr>
-          <p:cNvPr id="7" name="연결선: 꺾임 6">
-            <a:extLst>
-              <a:ext uri="{FF2B5EF4-FFF2-40B4-BE49-F238E27FC236}">
-                <a16:creationId xmlns:a16="http://schemas.microsoft.com/office/drawing/2014/main" id="{64EE32A6-C285-4739-9238-658A29832AD5}"/>
-              </a:ext>
-            </a:extLst>
-          </p:cNvPr>
-          <p:cNvCxnSpPr>
-            <a:cxnSpLocks/>
-          </p:cNvCxnSpPr>
+          <p:cNvPr id="7" name="연결선: 꺾임 6"/>
+          <p:cNvCxnSpPr/>
           <p:nvPr/>
         </p:nvCxnSpPr>
         <p:spPr>
@@ -12510,16 +12075,8 @@
       </p:cxnSp>
       <p:cxnSp>
         <p:nvCxnSpPr>
-          <p:cNvPr id="49" name="연결선: 꺾임 48">
-            <a:extLst>
-              <a:ext uri="{FF2B5EF4-FFF2-40B4-BE49-F238E27FC236}">
-                <a16:creationId xmlns:a16="http://schemas.microsoft.com/office/drawing/2014/main" id="{5B0D75E0-008A-472A-9096-3BC8D26D8947}"/>
-              </a:ext>
-            </a:extLst>
-          </p:cNvPr>
-          <p:cNvCxnSpPr>
-            <a:cxnSpLocks/>
-          </p:cNvCxnSpPr>
+          <p:cNvPr id="49" name="연결선: 꺾임 48"/>
+          <p:cNvCxnSpPr/>
           <p:nvPr/>
         </p:nvCxnSpPr>
         <p:spPr>
@@ -12595,9 +12152,7 @@
       <p:cxnSp>
         <p:nvCxnSpPr>
           <p:cNvPr id="671" name="Google Shape;671;p39"/>
-          <p:cNvCxnSpPr>
-            <a:cxnSpLocks/>
-          </p:cNvCxnSpPr>
+          <p:cNvCxnSpPr/>
           <p:nvPr/>
         </p:nvCxnSpPr>
         <p:spPr>
@@ -12622,13 +12177,7 @@
       </p:cxnSp>
       <p:sp>
         <p:nvSpPr>
-          <p:cNvPr id="9" name="Google Shape;172;p19">
-            <a:extLst>
-              <a:ext uri="{FF2B5EF4-FFF2-40B4-BE49-F238E27FC236}">
-                <a16:creationId xmlns:a16="http://schemas.microsoft.com/office/drawing/2014/main" id="{8ED20C3A-5326-47B0-B314-F2A847033D4C}"/>
-              </a:ext>
-            </a:extLst>
-          </p:cNvPr>
+          <p:cNvPr id="9" name="Google Shape;172;p19"/>
           <p:cNvSpPr/>
           <p:nvPr/>
         </p:nvSpPr>
@@ -12670,23 +12219,17 @@
               <a:solidFill>
                 <a:srgbClr val="FFFFFF"/>
               </a:solidFill>
-              <a:latin typeface="Arial"/>
-              <a:ea typeface="Arial"/>
-              <a:cs typeface="Arial"/>
-              <a:sym typeface="Arial"/>
+              <a:latin typeface="Arial" panose="020B0604020202020204"/>
+              <a:ea typeface="Arial" panose="020B0604020202020204"/>
+              <a:cs typeface="Arial" panose="020B0604020202020204"/>
+              <a:sym typeface="Arial" panose="020B0604020202020204"/>
             </a:endParaRPr>
           </a:p>
         </p:txBody>
       </p:sp>
       <p:cxnSp>
         <p:nvCxnSpPr>
-          <p:cNvPr id="10" name="Google Shape;173;p19">
-            <a:extLst>
-              <a:ext uri="{FF2B5EF4-FFF2-40B4-BE49-F238E27FC236}">
-                <a16:creationId xmlns:a16="http://schemas.microsoft.com/office/drawing/2014/main" id="{9C700D19-E690-4E9E-8210-534976693A70}"/>
-              </a:ext>
-            </a:extLst>
-          </p:cNvPr>
+          <p:cNvPr id="10" name="Google Shape;173;p19"/>
           <p:cNvCxnSpPr>
             <a:stCxn id="12" idx="2"/>
           </p:cNvCxnSpPr>
@@ -12714,13 +12257,7 @@
       </p:cxnSp>
       <p:grpSp>
         <p:nvGrpSpPr>
-          <p:cNvPr id="11" name="Google Shape;175;p19">
-            <a:extLst>
-              <a:ext uri="{FF2B5EF4-FFF2-40B4-BE49-F238E27FC236}">
-                <a16:creationId xmlns:a16="http://schemas.microsoft.com/office/drawing/2014/main" id="{E3A2027F-B8EF-4A1D-B011-B36E1E53A759}"/>
-              </a:ext>
-            </a:extLst>
-          </p:cNvPr>
+          <p:cNvPr id="11" name="Google Shape;175;p19"/>
           <p:cNvGrpSpPr/>
           <p:nvPr/>
         </p:nvGrpSpPr>
@@ -12734,13 +12271,7 @@
         </p:grpSpPr>
         <p:sp>
           <p:nvSpPr>
-            <p:cNvPr id="12" name="Google Shape;174;p19">
-              <a:extLst>
-                <a:ext uri="{FF2B5EF4-FFF2-40B4-BE49-F238E27FC236}">
-                  <a16:creationId xmlns:a16="http://schemas.microsoft.com/office/drawing/2014/main" id="{32A1950D-6880-40F0-B6DF-DF6D94BABD19}"/>
-                </a:ext>
-              </a:extLst>
-            </p:cNvPr>
+            <p:cNvPr id="12" name="Google Shape;174;p19"/>
             <p:cNvSpPr txBox="1"/>
             <p:nvPr/>
           </p:nvSpPr>
@@ -12773,14 +12304,14 @@
                 <a:buNone/>
               </a:pPr>
               <a:r>
-                <a:rPr lang="en-US" altLang="ko" sz="5000" dirty="0">
+                <a:rPr lang="en-US" altLang="en-US" sz="5000" dirty="0">
                   <a:solidFill>
                     <a:schemeClr val="lt1"/>
                   </a:solidFill>
                 </a:rPr>
                 <a:t>03</a:t>
               </a:r>
-              <a:endParaRPr lang="ko" altLang="en-US" sz="5000" dirty="0">
+              <a:endParaRPr lang="en-US" altLang="en-US" sz="5000" dirty="0">
                 <a:solidFill>
                   <a:schemeClr val="lt1"/>
                 </a:solidFill>
@@ -12790,13 +12321,7 @@
         </p:sp>
         <p:sp>
           <p:nvSpPr>
-            <p:cNvPr id="13" name="Google Shape;177;p19">
-              <a:extLst>
-                <a:ext uri="{FF2B5EF4-FFF2-40B4-BE49-F238E27FC236}">
-                  <a16:creationId xmlns:a16="http://schemas.microsoft.com/office/drawing/2014/main" id="{CBF2FBE5-C8EC-4A59-8C21-59D74126AD9C}"/>
-                </a:ext>
-              </a:extLst>
-            </p:cNvPr>
+            <p:cNvPr id="13" name="Google Shape;177;p19"/>
             <p:cNvSpPr txBox="1"/>
             <p:nvPr/>
           </p:nvSpPr>
@@ -12833,10 +12358,10 @@
                   <a:solidFill>
                     <a:schemeClr val="lt1"/>
                   </a:solidFill>
-                  <a:latin typeface="Malgun Gothic"/>
-                  <a:ea typeface="Malgun Gothic"/>
-                  <a:cs typeface="Malgun Gothic"/>
-                  <a:sym typeface="Malgun Gothic"/>
+                  <a:latin typeface="맑은 고딕" panose="020B0503020000020004" charset="-127"/>
+                  <a:ea typeface="맑은 고딕" panose="020B0503020000020004" charset="-127"/>
+                  <a:cs typeface="맑은 고딕" panose="020B0503020000020004" charset="-127"/>
+                  <a:sym typeface="맑은 고딕" panose="020B0503020000020004" charset="-127"/>
                 </a:rPr>
                 <a:t>프로젝트 후기</a:t>
               </a:r>
@@ -12844,10 +12369,10 @@
                 <a:solidFill>
                   <a:schemeClr val="lt1"/>
                 </a:solidFill>
-                <a:latin typeface="Malgun Gothic"/>
-                <a:ea typeface="Malgun Gothic"/>
-                <a:cs typeface="Malgun Gothic"/>
-                <a:sym typeface="Malgun Gothic"/>
+                <a:latin typeface="맑은 고딕" panose="020B0503020000020004" charset="-127"/>
+                <a:ea typeface="맑은 고딕" panose="020B0503020000020004" charset="-127"/>
+                <a:cs typeface="맑은 고딕" panose="020B0503020000020004" charset="-127"/>
+                <a:sym typeface="맑은 고딕" panose="020B0503020000020004" charset="-127"/>
               </a:endParaRPr>
             </a:p>
           </p:txBody>
@@ -12918,10 +12443,10 @@
               <a:solidFill>
                 <a:srgbClr val="FFFFFF"/>
               </a:solidFill>
-              <a:latin typeface="Arial"/>
-              <a:ea typeface="Arial"/>
-              <a:cs typeface="Arial"/>
-              <a:sym typeface="Arial"/>
+              <a:latin typeface="Arial" panose="020B0604020202020204"/>
+              <a:ea typeface="Arial" panose="020B0604020202020204"/>
+              <a:cs typeface="Arial" panose="020B0604020202020204"/>
+              <a:sym typeface="Arial" panose="020B0604020202020204"/>
             </a:endParaRPr>
           </a:p>
         </p:txBody>
@@ -12966,10 +12491,10 @@
               <a:solidFill>
                 <a:srgbClr val="FFFFFF"/>
               </a:solidFill>
-              <a:latin typeface="Arial"/>
-              <a:ea typeface="Arial"/>
-              <a:cs typeface="Arial"/>
-              <a:sym typeface="Arial"/>
+              <a:latin typeface="Arial" panose="020B0604020202020204"/>
+              <a:ea typeface="Arial" panose="020B0604020202020204"/>
+              <a:cs typeface="Arial" panose="020B0604020202020204"/>
+              <a:sym typeface="Arial" panose="020B0604020202020204"/>
             </a:endParaRPr>
           </a:p>
         </p:txBody>
@@ -13009,26 +12534,26 @@
               <a:buNone/>
             </a:pPr>
             <a:r>
-              <a:rPr lang="ko" sz="1500" dirty="0">
+              <a:rPr lang="en-US" sz="1500" dirty="0">
                 <a:solidFill>
                   <a:srgbClr val="3F3F3F"/>
                 </a:solidFill>
-                <a:latin typeface="Arial"/>
-                <a:ea typeface="Arial"/>
-                <a:cs typeface="Arial"/>
-                <a:sym typeface="Arial"/>
+                <a:latin typeface="Arial" panose="020B0604020202020204"/>
+                <a:ea typeface="Arial" panose="020B0604020202020204"/>
+                <a:cs typeface="Arial" panose="020B0604020202020204"/>
+                <a:sym typeface="Arial" panose="020B0604020202020204"/>
               </a:rPr>
               <a:t>PART </a:t>
             </a:r>
             <a:r>
-              <a:rPr lang="en-US" altLang="ko" sz="1500" dirty="0">
+              <a:rPr lang="en-US" altLang="en-US" sz="1500" dirty="0">
                 <a:solidFill>
                   <a:srgbClr val="3F3F3F"/>
                 </a:solidFill>
-                <a:latin typeface="Arial"/>
-                <a:ea typeface="Arial"/>
-                <a:cs typeface="Arial"/>
-                <a:sym typeface="Arial"/>
+                <a:latin typeface="Arial" panose="020B0604020202020204"/>
+                <a:ea typeface="Arial" panose="020B0604020202020204"/>
+                <a:cs typeface="Arial" panose="020B0604020202020204"/>
+                <a:sym typeface="Arial" panose="020B0604020202020204"/>
               </a:rPr>
               <a:t>3</a:t>
             </a:r>
@@ -13036,10 +12561,10 @@
               <a:solidFill>
                 <a:srgbClr val="3F3F3F"/>
               </a:solidFill>
-              <a:latin typeface="Arial"/>
-              <a:ea typeface="Arial"/>
-              <a:cs typeface="Arial"/>
-              <a:sym typeface="Arial"/>
+              <a:latin typeface="Arial" panose="020B0604020202020204"/>
+              <a:ea typeface="Arial" panose="020B0604020202020204"/>
+              <a:cs typeface="Arial" panose="020B0604020202020204"/>
+              <a:sym typeface="Arial" panose="020B0604020202020204"/>
             </a:endParaRPr>
           </a:p>
         </p:txBody>
@@ -13084,10 +12609,10 @@
               <a:solidFill>
                 <a:srgbClr val="FFFFFF"/>
               </a:solidFill>
-              <a:latin typeface="Arial"/>
-              <a:ea typeface="Arial"/>
-              <a:cs typeface="Arial"/>
-              <a:sym typeface="Arial"/>
+              <a:latin typeface="Arial" panose="020B0604020202020204"/>
+              <a:ea typeface="Arial" panose="020B0604020202020204"/>
+              <a:cs typeface="Arial" panose="020B0604020202020204"/>
+              <a:sym typeface="Arial" panose="020B0604020202020204"/>
             </a:endParaRPr>
           </a:p>
         </p:txBody>
@@ -13224,7 +12749,7 @@
               <a:buChar char="-"/>
             </a:pPr>
             <a:r>
-              <a:rPr lang="en-US" altLang="ko" dirty="0"/>
+              <a:rPr lang="en-US" altLang="en-US" dirty="0"/>
               <a:t>Servlet, JSP </a:t>
             </a:r>
             <a:r>
@@ -13616,8 +13141,11 @@
       </a:bgFillStyleLst>
     </a:fmtScheme>
   </a:themeElements>
-  <a:objectDefaults/>
-  <a:extraClrSchemeLst/>
+  <a:extLst>
+    <a:ext uri="{05A4C25C-085E-4340-85A3-A5531E510DB2}">
+      <thm15:themeFamily xmlns:thm15="http://schemas.microsoft.com/office/thememl/2012/main" name="Office Theme" id="{62F939B6-93AF-4DB8-9C6B-D6C7DFDC589F}" vid="{4A3C46E8-61CC-4603-A589-7422A47A8E4A}"/>
+    </a:ext>
+  </a:extLst>
 </a:theme>
 </file>
 
@@ -13897,7 +13425,10 @@
       </a:bgFillStyleLst>
     </a:fmtScheme>
   </a:themeElements>
-  <a:objectDefaults/>
-  <a:extraClrSchemeLst/>
+  <a:extLst>
+    <a:ext uri="{05A4C25C-085E-4340-85A3-A5531E510DB2}">
+      <thm15:themeFamily xmlns:thm15="http://schemas.microsoft.com/office/thememl/2012/main" name="Office Theme" id="{62F939B6-93AF-4DB8-9C6B-D6C7DFDC589F}" vid="{4A3C46E8-61CC-4603-A589-7422A47A8E4A}"/>
+    </a:ext>
+  </a:extLst>
 </a:theme>
 </file>
</xml_diff>